<commit_message>
workshop project review updates
</commit_message>
<xml_diff>
--- a/intro_workshop/an_intro_to_data_products.pptx
+++ b/intro_workshop/an_intro_to_data_products.pptx
@@ -8,11 +8,13 @@
     <p:sldId id="256" r:id="rId2"/>
     <p:sldId id="262" r:id="rId3"/>
     <p:sldId id="264" r:id="rId4"/>
-    <p:sldId id="263" r:id="rId5"/>
-    <p:sldId id="257" r:id="rId6"/>
-    <p:sldId id="259" r:id="rId7"/>
-    <p:sldId id="260" r:id="rId8"/>
-    <p:sldId id="266" r:id="rId9"/>
+    <p:sldId id="266" r:id="rId5"/>
+    <p:sldId id="267" r:id="rId6"/>
+    <p:sldId id="263" r:id="rId7"/>
+    <p:sldId id="257" r:id="rId8"/>
+    <p:sldId id="259" r:id="rId9"/>
+    <p:sldId id="260" r:id="rId10"/>
+    <p:sldId id="268" r:id="rId11"/>
   </p:sldIdLst>
   <p:sldSz cx="12192000" cy="6858000"/>
   <p:notesSz cx="6858000" cy="9144000"/>
@@ -111,6 +113,11 @@
       </a:defRPr>
     </a:lvl9pPr>
   </p:defaultTextStyle>
+  <p:extLst>
+    <p:ext uri="{EFAFB233-063F-42B5-8137-9DF3F51BA10A}">
+      <p15:sldGuideLst xmlns:p15="http://schemas.microsoft.com/office/powerpoint/2012/main"/>
+    </p:ext>
+  </p:extLst>
 </p:presentation>
 </file>
 
@@ -261,7 +268,7 @@
           <a:p>
             <a:fld id="{FF17ABC5-8B5B-4432-A367-5C631C868E67}" type="datetimeFigureOut">
               <a:rPr lang="en-US" smtClean="0"/>
-              <a:t>3/21/2020</a:t>
+              <a:t>3/22/2020</a:t>
             </a:fld>
             <a:endParaRPr lang="en-US"/>
           </a:p>
@@ -459,7 +466,7 @@
           <a:p>
             <a:fld id="{FF17ABC5-8B5B-4432-A367-5C631C868E67}" type="datetimeFigureOut">
               <a:rPr lang="en-US" smtClean="0"/>
-              <a:t>3/21/2020</a:t>
+              <a:t>3/22/2020</a:t>
             </a:fld>
             <a:endParaRPr lang="en-US"/>
           </a:p>
@@ -667,7 +674,7 @@
           <a:p>
             <a:fld id="{FF17ABC5-8B5B-4432-A367-5C631C868E67}" type="datetimeFigureOut">
               <a:rPr lang="en-US" smtClean="0"/>
-              <a:t>3/21/2020</a:t>
+              <a:t>3/22/2020</a:t>
             </a:fld>
             <a:endParaRPr lang="en-US"/>
           </a:p>
@@ -865,7 +872,7 @@
           <a:p>
             <a:fld id="{FF17ABC5-8B5B-4432-A367-5C631C868E67}" type="datetimeFigureOut">
               <a:rPr lang="en-US" smtClean="0"/>
-              <a:t>3/21/2020</a:t>
+              <a:t>3/22/2020</a:t>
             </a:fld>
             <a:endParaRPr lang="en-US"/>
           </a:p>
@@ -1140,7 +1147,7 @@
           <a:p>
             <a:fld id="{FF17ABC5-8B5B-4432-A367-5C631C868E67}" type="datetimeFigureOut">
               <a:rPr lang="en-US" smtClean="0"/>
-              <a:t>3/21/2020</a:t>
+              <a:t>3/22/2020</a:t>
             </a:fld>
             <a:endParaRPr lang="en-US"/>
           </a:p>
@@ -1405,7 +1412,7 @@
           <a:p>
             <a:fld id="{FF17ABC5-8B5B-4432-A367-5C631C868E67}" type="datetimeFigureOut">
               <a:rPr lang="en-US" smtClean="0"/>
-              <a:t>3/21/2020</a:t>
+              <a:t>3/22/2020</a:t>
             </a:fld>
             <a:endParaRPr lang="en-US"/>
           </a:p>
@@ -1817,7 +1824,7 @@
           <a:p>
             <a:fld id="{FF17ABC5-8B5B-4432-A367-5C631C868E67}" type="datetimeFigureOut">
               <a:rPr lang="en-US" smtClean="0"/>
-              <a:t>3/21/2020</a:t>
+              <a:t>3/22/2020</a:t>
             </a:fld>
             <a:endParaRPr lang="en-US"/>
           </a:p>
@@ -1958,7 +1965,7 @@
           <a:p>
             <a:fld id="{FF17ABC5-8B5B-4432-A367-5C631C868E67}" type="datetimeFigureOut">
               <a:rPr lang="en-US" smtClean="0"/>
-              <a:t>3/21/2020</a:t>
+              <a:t>3/22/2020</a:t>
             </a:fld>
             <a:endParaRPr lang="en-US"/>
           </a:p>
@@ -2071,7 +2078,7 @@
           <a:p>
             <a:fld id="{FF17ABC5-8B5B-4432-A367-5C631C868E67}" type="datetimeFigureOut">
               <a:rPr lang="en-US" smtClean="0"/>
-              <a:t>3/21/2020</a:t>
+              <a:t>3/22/2020</a:t>
             </a:fld>
             <a:endParaRPr lang="en-US"/>
           </a:p>
@@ -2382,7 +2389,7 @@
           <a:p>
             <a:fld id="{FF17ABC5-8B5B-4432-A367-5C631C868E67}" type="datetimeFigureOut">
               <a:rPr lang="en-US" smtClean="0"/>
-              <a:t>3/21/2020</a:t>
+              <a:t>3/22/2020</a:t>
             </a:fld>
             <a:endParaRPr lang="en-US"/>
           </a:p>
@@ -2670,7 +2677,7 @@
           <a:p>
             <a:fld id="{FF17ABC5-8B5B-4432-A367-5C631C868E67}" type="datetimeFigureOut">
               <a:rPr lang="en-US" smtClean="0"/>
-              <a:t>3/21/2020</a:t>
+              <a:t>3/22/2020</a:t>
             </a:fld>
             <a:endParaRPr lang="en-US"/>
           </a:p>
@@ -2911,7 +2918,7 @@
           <a:p>
             <a:fld id="{FF17ABC5-8B5B-4432-A367-5C631C868E67}" type="datetimeFigureOut">
               <a:rPr lang="en-US" smtClean="0"/>
-              <a:t>3/21/2020</a:t>
+              <a:t>3/22/2020</a:t>
             </a:fld>
             <a:endParaRPr lang="en-US"/>
           </a:p>
@@ -3346,10 +3353,29 @@
         </p:nvSpPr>
         <p:spPr/>
         <p:txBody>
-          <a:bodyPr/>
+          <a:bodyPr>
+            <a:normAutofit fontScale="90000"/>
+          </a:bodyPr>
           <a:lstStyle/>
           <a:p>
-            <a:endParaRPr lang="en-US" dirty="0"/>
+            <a:r>
+              <a:rPr lang="en-US" dirty="0"/>
+              <a:t>Data Products</a:t>
+            </a:r>
+            <a:br>
+              <a:rPr lang="en-US" dirty="0"/>
+            </a:br>
+            <a:r>
+              <a:rPr lang="en-US" dirty="0"/>
+              <a:t>with</a:t>
+            </a:r>
+            <a:br>
+              <a:rPr lang="en-US" dirty="0"/>
+            </a:br>
+            <a:r>
+              <a:rPr lang="en-US" dirty="0"/>
+              <a:t>Python</a:t>
+            </a:r>
           </a:p>
         </p:txBody>
       </p:sp>
@@ -3374,7 +3400,10 @@
           <a:bodyPr/>
           <a:lstStyle/>
           <a:p>
-            <a:endParaRPr lang="en-US"/>
+            <a:r>
+              <a:rPr lang="en-US" dirty="0"/>
+              <a:t>Workshop</a:t>
+            </a:r>
           </a:p>
         </p:txBody>
       </p:sp>
@@ -3382,6 +3411,658 @@
     <p:extLst>
       <p:ext uri="{BB962C8B-B14F-4D97-AF65-F5344CB8AC3E}">
         <p14:creationId xmlns:p14="http://schemas.microsoft.com/office/powerpoint/2010/main" val="14870452"/>
+      </p:ext>
+    </p:extLst>
+  </p:cSld>
+  <p:clrMapOvr>
+    <a:masterClrMapping/>
+  </p:clrMapOvr>
+</p:sld>
+</file>
+
+<file path=ppt/slides/slide10.xml><?xml version="1.0" encoding="utf-8"?>
+<p:sld xmlns:a="http://schemas.openxmlformats.org/drawingml/2006/main" xmlns:r="http://schemas.openxmlformats.org/officeDocument/2006/relationships" xmlns:p="http://schemas.openxmlformats.org/presentationml/2006/main">
+  <p:cSld>
+    <p:spTree>
+      <p:nvGrpSpPr>
+        <p:cNvPr id="1" name=""/>
+        <p:cNvGrpSpPr/>
+        <p:nvPr/>
+      </p:nvGrpSpPr>
+      <p:grpSpPr>
+        <a:xfrm>
+          <a:off x="0" y="0"/>
+          <a:ext cx="0" cy="0"/>
+          <a:chOff x="0" y="0"/>
+          <a:chExt cx="0" cy="0"/>
+        </a:xfrm>
+      </p:grpSpPr>
+      <p:sp>
+        <p:nvSpPr>
+          <p:cNvPr id="2" name="Title 1">
+            <a:extLst>
+              <a:ext uri="{FF2B5EF4-FFF2-40B4-BE49-F238E27FC236}">
+                <a16:creationId xmlns:a16="http://schemas.microsoft.com/office/drawing/2014/main" id="{5068025D-663A-40F9-A40B-214B32CD77F1}"/>
+              </a:ext>
+            </a:extLst>
+          </p:cNvPr>
+          <p:cNvSpPr>
+            <a:spLocks noGrp="1"/>
+          </p:cNvSpPr>
+          <p:nvPr>
+            <p:ph type="title"/>
+          </p:nvPr>
+        </p:nvSpPr>
+        <p:spPr>
+          <a:xfrm>
+            <a:off x="663633" y="243536"/>
+            <a:ext cx="11353800" cy="555233"/>
+          </a:xfrm>
+        </p:spPr>
+        <p:txBody>
+          <a:bodyPr>
+            <a:normAutofit fontScale="90000"/>
+          </a:bodyPr>
+          <a:lstStyle/>
+          <a:p>
+            <a:r>
+              <a:rPr lang="en-US" dirty="0"/>
+              <a:t>How we work</a:t>
+            </a:r>
+          </a:p>
+        </p:txBody>
+      </p:sp>
+      <p:pic>
+        <p:nvPicPr>
+          <p:cNvPr id="3" name="Picture 2">
+            <a:extLst>
+              <a:ext uri="{FF2B5EF4-FFF2-40B4-BE49-F238E27FC236}">
+                <a16:creationId xmlns:a16="http://schemas.microsoft.com/office/drawing/2014/main" id="{F5A24808-106B-4215-92E8-CCE2838509C4}"/>
+              </a:ext>
+            </a:extLst>
+          </p:cNvPr>
+          <p:cNvPicPr>
+            <a:picLocks noChangeAspect="1"/>
+          </p:cNvPicPr>
+          <p:nvPr/>
+        </p:nvPicPr>
+        <p:blipFill>
+          <a:blip r:embed="rId2"/>
+          <a:stretch>
+            <a:fillRect/>
+          </a:stretch>
+        </p:blipFill>
+        <p:spPr>
+          <a:xfrm>
+            <a:off x="531658" y="1726812"/>
+            <a:ext cx="3491129" cy="1960851"/>
+          </a:xfrm>
+          <a:prstGeom prst="rect">
+            <a:avLst/>
+          </a:prstGeom>
+        </p:spPr>
+      </p:pic>
+      <p:sp>
+        <p:nvSpPr>
+          <p:cNvPr id="29" name="Rectangle 28">
+            <a:extLst>
+              <a:ext uri="{FF2B5EF4-FFF2-40B4-BE49-F238E27FC236}">
+                <a16:creationId xmlns:a16="http://schemas.microsoft.com/office/drawing/2014/main" id="{CDDACAEE-1432-4329-BA2B-B689A4734057}"/>
+              </a:ext>
+            </a:extLst>
+          </p:cNvPr>
+          <p:cNvSpPr/>
+          <p:nvPr/>
+        </p:nvSpPr>
+        <p:spPr>
+          <a:xfrm>
+            <a:off x="531658" y="1135281"/>
+            <a:ext cx="3491129" cy="555233"/>
+          </a:xfrm>
+          <a:prstGeom prst="rect">
+            <a:avLst/>
+          </a:prstGeom>
+          <a:solidFill>
+            <a:schemeClr val="bg2">
+              <a:lumMod val="25000"/>
+            </a:schemeClr>
+          </a:solidFill>
+          <a:ln>
+            <a:noFill/>
+          </a:ln>
+        </p:spPr>
+        <p:style>
+          <a:lnRef idx="2">
+            <a:schemeClr val="accent1">
+              <a:shade val="50000"/>
+            </a:schemeClr>
+          </a:lnRef>
+          <a:fillRef idx="1">
+            <a:schemeClr val="accent1"/>
+          </a:fillRef>
+          <a:effectRef idx="0">
+            <a:schemeClr val="accent1"/>
+          </a:effectRef>
+          <a:fontRef idx="minor">
+            <a:schemeClr val="lt1"/>
+          </a:fontRef>
+        </p:style>
+        <p:txBody>
+          <a:bodyPr rtlCol="0" anchor="ctr"/>
+          <a:lstStyle/>
+          <a:p>
+            <a:pPr algn="ctr"/>
+            <a:r>
+              <a:rPr lang="en-US" dirty="0"/>
+              <a:t>Focus on </a:t>
+            </a:r>
+            <a:r>
+              <a:rPr lang="en-US" u="sng" dirty="0"/>
+              <a:t>doing</a:t>
+            </a:r>
+            <a:r>
+              <a:rPr lang="en-US" dirty="0"/>
+              <a:t> but in the </a:t>
+            </a:r>
+            <a:r>
+              <a:rPr lang="en-US" u="sng" dirty="0"/>
+              <a:t>right</a:t>
+            </a:r>
+            <a:r>
+              <a:rPr lang="en-US" dirty="0"/>
+              <a:t> way</a:t>
+            </a:r>
+          </a:p>
+        </p:txBody>
+      </p:sp>
+      <p:sp>
+        <p:nvSpPr>
+          <p:cNvPr id="31" name="Rectangle 30">
+            <a:extLst>
+              <a:ext uri="{FF2B5EF4-FFF2-40B4-BE49-F238E27FC236}">
+                <a16:creationId xmlns:a16="http://schemas.microsoft.com/office/drawing/2014/main" id="{19CB63C5-A36E-4C38-8B31-9AB0E07CECA5}"/>
+              </a:ext>
+            </a:extLst>
+          </p:cNvPr>
+          <p:cNvSpPr/>
+          <p:nvPr/>
+        </p:nvSpPr>
+        <p:spPr>
+          <a:xfrm>
+            <a:off x="4414136" y="1135280"/>
+            <a:ext cx="3491129" cy="555233"/>
+          </a:xfrm>
+          <a:prstGeom prst="rect">
+            <a:avLst/>
+          </a:prstGeom>
+          <a:solidFill>
+            <a:schemeClr val="bg2">
+              <a:lumMod val="25000"/>
+            </a:schemeClr>
+          </a:solidFill>
+          <a:ln>
+            <a:noFill/>
+          </a:ln>
+        </p:spPr>
+        <p:style>
+          <a:lnRef idx="2">
+            <a:schemeClr val="accent1">
+              <a:shade val="50000"/>
+            </a:schemeClr>
+          </a:lnRef>
+          <a:fillRef idx="1">
+            <a:schemeClr val="accent1"/>
+          </a:fillRef>
+          <a:effectRef idx="0">
+            <a:schemeClr val="accent1"/>
+          </a:effectRef>
+          <a:fontRef idx="minor">
+            <a:schemeClr val="lt1"/>
+          </a:fontRef>
+        </p:style>
+        <p:txBody>
+          <a:bodyPr rtlCol="0" anchor="ctr"/>
+          <a:lstStyle/>
+          <a:p>
+            <a:pPr algn="ctr"/>
+            <a:r>
+              <a:rPr lang="en-US" dirty="0"/>
+              <a:t>Become your own </a:t>
+            </a:r>
+            <a:r>
+              <a:rPr lang="en-US" u="sng" dirty="0"/>
+              <a:t>teacher</a:t>
+            </a:r>
+          </a:p>
+        </p:txBody>
+      </p:sp>
+      <p:pic>
+        <p:nvPicPr>
+          <p:cNvPr id="3076" name="Picture 4" descr="Do You Really Need a Degree to Pursue a Design Career ...">
+            <a:extLst>
+              <a:ext uri="{FF2B5EF4-FFF2-40B4-BE49-F238E27FC236}">
+                <a16:creationId xmlns:a16="http://schemas.microsoft.com/office/drawing/2014/main" id="{40484AAE-15DE-455D-8111-25EA914C9A02}"/>
+              </a:ext>
+            </a:extLst>
+          </p:cNvPr>
+          <p:cNvPicPr>
+            <a:picLocks noChangeAspect="1" noChangeArrowheads="1"/>
+          </p:cNvPicPr>
+          <p:nvPr/>
+        </p:nvPicPr>
+        <p:blipFill>
+          <a:blip r:embed="rId3">
+            <a:extLst>
+              <a:ext uri="{28A0092B-C50C-407E-A947-70E740481C1C}">
+                <a14:useLocalDpi xmlns:a14="http://schemas.microsoft.com/office/drawing/2010/main" val="0"/>
+              </a:ext>
+            </a:extLst>
+          </a:blip>
+          <a:srcRect/>
+          <a:stretch>
+            <a:fillRect/>
+          </a:stretch>
+        </p:blipFill>
+        <p:spPr bwMode="auto">
+          <a:xfrm>
+            <a:off x="4414136" y="1726811"/>
+            <a:ext cx="3491129" cy="1960851"/>
+          </a:xfrm>
+          <a:prstGeom prst="rect">
+            <a:avLst/>
+          </a:prstGeom>
+          <a:noFill/>
+          <a:extLst>
+            <a:ext uri="{909E8E84-426E-40DD-AFC4-6F175D3DCCD1}">
+              <a14:hiddenFill xmlns:a14="http://schemas.microsoft.com/office/drawing/2010/main">
+                <a:solidFill>
+                  <a:srgbClr val="FFFFFF"/>
+                </a:solidFill>
+              </a14:hiddenFill>
+            </a:ext>
+          </a:extLst>
+        </p:spPr>
+      </p:pic>
+      <p:pic>
+        <p:nvPicPr>
+          <p:cNvPr id="8" name="Picture 7">
+            <a:extLst>
+              <a:ext uri="{FF2B5EF4-FFF2-40B4-BE49-F238E27FC236}">
+                <a16:creationId xmlns:a16="http://schemas.microsoft.com/office/drawing/2014/main" id="{47AC1C5C-54EA-49ED-8B80-A40A05F35887}"/>
+              </a:ext>
+            </a:extLst>
+          </p:cNvPr>
+          <p:cNvPicPr>
+            <a:picLocks noChangeAspect="1"/>
+          </p:cNvPicPr>
+          <p:nvPr/>
+        </p:nvPicPr>
+        <p:blipFill>
+          <a:blip r:embed="rId4"/>
+          <a:stretch>
+            <a:fillRect/>
+          </a:stretch>
+        </p:blipFill>
+        <p:spPr>
+          <a:xfrm>
+            <a:off x="531658" y="5322234"/>
+            <a:ext cx="2324100" cy="647700"/>
+          </a:xfrm>
+          <a:prstGeom prst="rect">
+            <a:avLst/>
+          </a:prstGeom>
+        </p:spPr>
+      </p:pic>
+      <p:sp>
+        <p:nvSpPr>
+          <p:cNvPr id="34" name="Rectangle 33">
+            <a:extLst>
+              <a:ext uri="{FF2B5EF4-FFF2-40B4-BE49-F238E27FC236}">
+                <a16:creationId xmlns:a16="http://schemas.microsoft.com/office/drawing/2014/main" id="{E679868D-9AB4-46FF-970A-946B17D1E3C1}"/>
+              </a:ext>
+            </a:extLst>
+          </p:cNvPr>
+          <p:cNvSpPr/>
+          <p:nvPr/>
+        </p:nvSpPr>
+        <p:spPr>
+          <a:xfrm>
+            <a:off x="531658" y="4375822"/>
+            <a:ext cx="11035031" cy="406743"/>
+          </a:xfrm>
+          <a:prstGeom prst="rect">
+            <a:avLst/>
+          </a:prstGeom>
+          <a:solidFill>
+            <a:schemeClr val="bg2">
+              <a:lumMod val="25000"/>
+            </a:schemeClr>
+          </a:solidFill>
+          <a:ln>
+            <a:noFill/>
+          </a:ln>
+        </p:spPr>
+        <p:style>
+          <a:lnRef idx="2">
+            <a:schemeClr val="accent1">
+              <a:shade val="50000"/>
+            </a:schemeClr>
+          </a:lnRef>
+          <a:fillRef idx="1">
+            <a:schemeClr val="accent1"/>
+          </a:fillRef>
+          <a:effectRef idx="0">
+            <a:schemeClr val="accent1"/>
+          </a:effectRef>
+          <a:fontRef idx="minor">
+            <a:schemeClr val="lt1"/>
+          </a:fontRef>
+        </p:style>
+        <p:txBody>
+          <a:bodyPr rtlCol="0" anchor="ctr"/>
+          <a:lstStyle/>
+          <a:p>
+            <a:pPr algn="ctr"/>
+            <a:r>
+              <a:rPr lang="en-US" dirty="0"/>
+              <a:t>Great learning resources for building data products with Python (do focus both on technical &amp; selling skills)</a:t>
+            </a:r>
+          </a:p>
+        </p:txBody>
+      </p:sp>
+      <p:pic>
+        <p:nvPicPr>
+          <p:cNvPr id="32" name="Picture 31">
+            <a:extLst>
+              <a:ext uri="{FF2B5EF4-FFF2-40B4-BE49-F238E27FC236}">
+                <a16:creationId xmlns:a16="http://schemas.microsoft.com/office/drawing/2014/main" id="{BA539F35-FE01-4AFB-8AE1-D20F8A70478C}"/>
+              </a:ext>
+            </a:extLst>
+          </p:cNvPr>
+          <p:cNvPicPr>
+            <a:picLocks noChangeAspect="1"/>
+          </p:cNvPicPr>
+          <p:nvPr/>
+        </p:nvPicPr>
+        <p:blipFill>
+          <a:blip r:embed="rId5"/>
+          <a:stretch>
+            <a:fillRect/>
+          </a:stretch>
+        </p:blipFill>
+        <p:spPr>
+          <a:xfrm>
+            <a:off x="3097126" y="5018170"/>
+            <a:ext cx="1851322" cy="764307"/>
+          </a:xfrm>
+          <a:prstGeom prst="rect">
+            <a:avLst/>
+          </a:prstGeom>
+        </p:spPr>
+      </p:pic>
+      <p:pic>
+        <p:nvPicPr>
+          <p:cNvPr id="33" name="Picture 32">
+            <a:extLst>
+              <a:ext uri="{FF2B5EF4-FFF2-40B4-BE49-F238E27FC236}">
+                <a16:creationId xmlns:a16="http://schemas.microsoft.com/office/drawing/2014/main" id="{199E3053-0FD4-4B91-8719-09467B5B10EC}"/>
+              </a:ext>
+            </a:extLst>
+          </p:cNvPr>
+          <p:cNvPicPr>
+            <a:picLocks noChangeAspect="1"/>
+          </p:cNvPicPr>
+          <p:nvPr/>
+        </p:nvPicPr>
+        <p:blipFill>
+          <a:blip r:embed="rId6"/>
+          <a:stretch>
+            <a:fillRect/>
+          </a:stretch>
+        </p:blipFill>
+        <p:spPr>
+          <a:xfrm>
+            <a:off x="8733292" y="5322234"/>
+            <a:ext cx="1536138" cy="647700"/>
+          </a:xfrm>
+          <a:prstGeom prst="rect">
+            <a:avLst/>
+          </a:prstGeom>
+        </p:spPr>
+      </p:pic>
+      <p:pic>
+        <p:nvPicPr>
+          <p:cNvPr id="35" name="Picture 34">
+            <a:extLst>
+              <a:ext uri="{FF2B5EF4-FFF2-40B4-BE49-F238E27FC236}">
+                <a16:creationId xmlns:a16="http://schemas.microsoft.com/office/drawing/2014/main" id="{54A03E97-95BB-4E33-8D30-BA7CF6D14DBC}"/>
+              </a:ext>
+            </a:extLst>
+          </p:cNvPr>
+          <p:cNvPicPr>
+            <a:picLocks noChangeAspect="1"/>
+          </p:cNvPicPr>
+          <p:nvPr/>
+        </p:nvPicPr>
+        <p:blipFill>
+          <a:blip r:embed="rId7"/>
+          <a:stretch>
+            <a:fillRect/>
+          </a:stretch>
+        </p:blipFill>
+        <p:spPr>
+          <a:xfrm>
+            <a:off x="10441697" y="4956197"/>
+            <a:ext cx="920793" cy="1401441"/>
+          </a:xfrm>
+          <a:prstGeom prst="rect">
+            <a:avLst/>
+          </a:prstGeom>
+        </p:spPr>
+      </p:pic>
+      <p:pic>
+        <p:nvPicPr>
+          <p:cNvPr id="36" name="Picture 35">
+            <a:extLst>
+              <a:ext uri="{FF2B5EF4-FFF2-40B4-BE49-F238E27FC236}">
+                <a16:creationId xmlns:a16="http://schemas.microsoft.com/office/drawing/2014/main" id="{8FAEFDBA-7C34-4679-9E72-EFE3ECA482FC}"/>
+              </a:ext>
+            </a:extLst>
+          </p:cNvPr>
+          <p:cNvPicPr>
+            <a:picLocks noChangeAspect="1"/>
+          </p:cNvPicPr>
+          <p:nvPr/>
+        </p:nvPicPr>
+        <p:blipFill>
+          <a:blip r:embed="rId8"/>
+          <a:stretch>
+            <a:fillRect/>
+          </a:stretch>
+        </p:blipFill>
+        <p:spPr>
+          <a:xfrm>
+            <a:off x="6223950" y="5782477"/>
+            <a:ext cx="2125057" cy="609450"/>
+          </a:xfrm>
+          <a:prstGeom prst="rect">
+            <a:avLst/>
+          </a:prstGeom>
+        </p:spPr>
+      </p:pic>
+      <p:pic>
+        <p:nvPicPr>
+          <p:cNvPr id="37" name="Picture 36">
+            <a:extLst>
+              <a:ext uri="{FF2B5EF4-FFF2-40B4-BE49-F238E27FC236}">
+                <a16:creationId xmlns:a16="http://schemas.microsoft.com/office/drawing/2014/main" id="{2218034B-ABC4-4F28-B9EF-13A98C929533}"/>
+              </a:ext>
+            </a:extLst>
+          </p:cNvPr>
+          <p:cNvPicPr>
+            <a:picLocks noChangeAspect="1"/>
+          </p:cNvPicPr>
+          <p:nvPr/>
+        </p:nvPicPr>
+        <p:blipFill>
+          <a:blip r:embed="rId9"/>
+          <a:stretch>
+            <a:fillRect/>
+          </a:stretch>
+        </p:blipFill>
+        <p:spPr>
+          <a:xfrm>
+            <a:off x="5773827" y="4882750"/>
+            <a:ext cx="1733550" cy="695325"/>
+          </a:xfrm>
+          <a:prstGeom prst="rect">
+            <a:avLst/>
+          </a:prstGeom>
+        </p:spPr>
+      </p:pic>
+      <p:pic>
+        <p:nvPicPr>
+          <p:cNvPr id="38" name="Picture 37">
+            <a:extLst>
+              <a:ext uri="{FF2B5EF4-FFF2-40B4-BE49-F238E27FC236}">
+                <a16:creationId xmlns:a16="http://schemas.microsoft.com/office/drawing/2014/main" id="{E8D6E821-D2C4-4E3C-8F70-107F1CD97E83}"/>
+              </a:ext>
+            </a:extLst>
+          </p:cNvPr>
+          <p:cNvPicPr>
+            <a:picLocks noChangeAspect="1"/>
+          </p:cNvPicPr>
+          <p:nvPr/>
+        </p:nvPicPr>
+        <p:blipFill>
+          <a:blip r:embed="rId10"/>
+          <a:stretch>
+            <a:fillRect/>
+          </a:stretch>
+        </p:blipFill>
+        <p:spPr>
+          <a:xfrm>
+            <a:off x="4022787" y="5821059"/>
+            <a:ext cx="1664486" cy="793405"/>
+          </a:xfrm>
+          <a:prstGeom prst="rect">
+            <a:avLst/>
+          </a:prstGeom>
+        </p:spPr>
+      </p:pic>
+      <p:sp>
+        <p:nvSpPr>
+          <p:cNvPr id="41" name="Rectangle 40">
+            <a:extLst>
+              <a:ext uri="{FF2B5EF4-FFF2-40B4-BE49-F238E27FC236}">
+                <a16:creationId xmlns:a16="http://schemas.microsoft.com/office/drawing/2014/main" id="{789A10A4-8CD6-4E58-A367-D65601E249B1}"/>
+              </a:ext>
+            </a:extLst>
+          </p:cNvPr>
+          <p:cNvSpPr/>
+          <p:nvPr/>
+        </p:nvSpPr>
+        <p:spPr>
+          <a:xfrm>
+            <a:off x="8296614" y="1135280"/>
+            <a:ext cx="3491129" cy="555233"/>
+          </a:xfrm>
+          <a:prstGeom prst="rect">
+            <a:avLst/>
+          </a:prstGeom>
+          <a:solidFill>
+            <a:schemeClr val="bg2">
+              <a:lumMod val="25000"/>
+            </a:schemeClr>
+          </a:solidFill>
+          <a:ln>
+            <a:noFill/>
+          </a:ln>
+        </p:spPr>
+        <p:style>
+          <a:lnRef idx="2">
+            <a:schemeClr val="accent1">
+              <a:shade val="50000"/>
+            </a:schemeClr>
+          </a:lnRef>
+          <a:fillRef idx="1">
+            <a:schemeClr val="accent1"/>
+          </a:fillRef>
+          <a:effectRef idx="0">
+            <a:schemeClr val="accent1"/>
+          </a:effectRef>
+          <a:fontRef idx="minor">
+            <a:schemeClr val="lt1"/>
+          </a:fontRef>
+        </p:style>
+        <p:txBody>
+          <a:bodyPr rtlCol="0" anchor="ctr"/>
+          <a:lstStyle/>
+          <a:p>
+            <a:pPr algn="ctr"/>
+            <a:r>
+              <a:rPr lang="en-US" u="sng" dirty="0"/>
+              <a:t>Build</a:t>
+            </a:r>
+            <a:r>
+              <a:rPr lang="en-US" dirty="0"/>
+              <a:t> data products with others</a:t>
+            </a:r>
+            <a:endParaRPr lang="en-US" u="sng" dirty="0"/>
+          </a:p>
+        </p:txBody>
+      </p:sp>
+      <p:pic>
+        <p:nvPicPr>
+          <p:cNvPr id="3078" name="Picture 6" descr="GitHub vs GitLab vs BitBucket Server (Formerly Stash ...">
+            <a:extLst>
+              <a:ext uri="{FF2B5EF4-FFF2-40B4-BE49-F238E27FC236}">
+                <a16:creationId xmlns:a16="http://schemas.microsoft.com/office/drawing/2014/main" id="{AB7DBC1D-8B51-4881-8119-D9B5949B7C90}"/>
+              </a:ext>
+            </a:extLst>
+          </p:cNvPr>
+          <p:cNvPicPr>
+            <a:picLocks noChangeAspect="1" noChangeArrowheads="1"/>
+          </p:cNvPicPr>
+          <p:nvPr/>
+        </p:nvPicPr>
+        <p:blipFill>
+          <a:blip r:embed="rId11">
+            <a:extLst>
+              <a:ext uri="{28A0092B-C50C-407E-A947-70E740481C1C}">
+                <a14:useLocalDpi xmlns:a14="http://schemas.microsoft.com/office/drawing/2010/main" val="0"/>
+              </a:ext>
+            </a:extLst>
+          </a:blip>
+          <a:srcRect/>
+          <a:stretch>
+            <a:fillRect/>
+          </a:stretch>
+        </p:blipFill>
+        <p:spPr bwMode="auto">
+          <a:xfrm>
+            <a:off x="9089161" y="1690513"/>
+            <a:ext cx="1906034" cy="1965598"/>
+          </a:xfrm>
+          <a:prstGeom prst="rect">
+            <a:avLst/>
+          </a:prstGeom>
+          <a:noFill/>
+          <a:extLst>
+            <a:ext uri="{909E8E84-426E-40DD-AFC4-6F175D3DCCD1}">
+              <a14:hiddenFill xmlns:a14="http://schemas.microsoft.com/office/drawing/2010/main">
+                <a:solidFill>
+                  <a:srgbClr val="FFFFFF"/>
+                </a:solidFill>
+              </a14:hiddenFill>
+            </a:ext>
+          </a:extLst>
+        </p:spPr>
+      </p:pic>
+    </p:spTree>
+    <p:extLst>
+      <p:ext uri="{BB962C8B-B14F-4D97-AF65-F5344CB8AC3E}">
+        <p14:creationId xmlns:p14="http://schemas.microsoft.com/office/powerpoint/2010/main" val="2988713364"/>
       </p:ext>
     </p:extLst>
   </p:cSld>
@@ -3662,7 +4343,7 @@
         </p:blipFill>
         <p:spPr bwMode="auto">
           <a:xfrm>
-            <a:off x="3549766" y="3957320"/>
+            <a:off x="3670230" y="4438087"/>
             <a:ext cx="2790767" cy="2093075"/>
           </a:xfrm>
           <a:prstGeom prst="rect">
@@ -3814,7 +4495,7 @@
         </p:blipFill>
         <p:spPr bwMode="auto">
           <a:xfrm>
-            <a:off x="663633" y="3429000"/>
+            <a:off x="784097" y="3909767"/>
             <a:ext cx="2614875" cy="1956062"/>
           </a:xfrm>
           <a:prstGeom prst="rect">
@@ -3861,7 +4542,7 @@
         </p:blipFill>
         <p:spPr bwMode="auto">
           <a:xfrm>
-            <a:off x="663633" y="1081912"/>
+            <a:off x="784097" y="1562679"/>
             <a:ext cx="1612934" cy="2063944"/>
           </a:xfrm>
           <a:prstGeom prst="rect">
@@ -3894,7 +4575,7 @@
         <p:spPr>
           <a:xfrm>
             <a:off x="7966640" y="970959"/>
-            <a:ext cx="3441263" cy="2308324"/>
+            <a:ext cx="3741451" cy="1200329"/>
           </a:xfrm>
           <a:prstGeom prst="rect">
             <a:avLst/>
@@ -3902,7 +4583,7 @@
           <a:noFill/>
         </p:spPr>
         <p:txBody>
-          <a:bodyPr wrap="none" rtlCol="0">
+          <a:bodyPr wrap="square" rtlCol="0">
             <a:spAutoFit/>
           </a:bodyPr>
           <a:lstStyle/>
@@ -3913,13 +4594,7 @@
             </a:pPr>
             <a:r>
               <a:rPr lang="en-US" dirty="0"/>
-              <a:t>Business Case for data products</a:t>
-            </a:r>
-          </a:p>
-          <a:p>
-            <a:r>
-              <a:rPr lang="en-US" dirty="0"/>
-              <a:t>Install</a:t>
+              <a:t>Why data products</a:t>
             </a:r>
           </a:p>
           <a:p>
@@ -3929,7 +4604,7 @@
             </a:pPr>
             <a:r>
               <a:rPr lang="en-US" dirty="0"/>
-              <a:t>Version control (git)</a:t>
+              <a:t>Business Case for data products</a:t>
             </a:r>
           </a:p>
           <a:p>
@@ -3939,7 +4614,7 @@
             </a:pPr>
             <a:r>
               <a:rPr lang="en-US" dirty="0"/>
-              <a:t>Python</a:t>
+              <a:t>How we work</a:t>
             </a:r>
           </a:p>
           <a:p>
@@ -3947,32 +4622,9 @@
               <a:buFont typeface="Arial" panose="020B0604020202020204" pitchFamily="34" charset="0"/>
               <a:buChar char="•"/>
             </a:pPr>
-            <a:endParaRPr lang="en-US" dirty="0"/>
-          </a:p>
-          <a:p>
             <a:r>
               <a:rPr lang="en-US" dirty="0"/>
-              <a:t>First exercises</a:t>
-            </a:r>
-          </a:p>
-          <a:p>
-            <a:pPr marL="285750" indent="-285750">
-              <a:buFont typeface="Arial" panose="020B0604020202020204" pitchFamily="34" charset="0"/>
-              <a:buChar char="•"/>
-            </a:pPr>
-            <a:r>
-              <a:rPr lang="en-US" dirty="0"/>
-              <a:t>SQL</a:t>
-            </a:r>
-          </a:p>
-          <a:p>
-            <a:pPr marL="285750" indent="-285750">
-              <a:buFont typeface="Arial" panose="020B0604020202020204" pitchFamily="34" charset="0"/>
-              <a:buChar char="•"/>
-            </a:pPr>
-            <a:r>
-              <a:rPr lang="en-US" dirty="0"/>
-              <a:t>Pandas</a:t>
+              <a:t>Workshop</a:t>
             </a:r>
           </a:p>
         </p:txBody>
@@ -4066,7 +4718,7 @@
           <p:cNvPr id="2" name="Title 1">
             <a:extLst>
               <a:ext uri="{FF2B5EF4-FFF2-40B4-BE49-F238E27FC236}">
-                <a16:creationId xmlns:a16="http://schemas.microsoft.com/office/drawing/2014/main" id="{A51387C6-CDCC-4F57-8C2F-434FA96355C1}"/>
+                <a16:creationId xmlns:a16="http://schemas.microsoft.com/office/drawing/2014/main" id="{5068025D-663A-40F9-A40B-214B32CD77F1}"/>
               </a:ext>
             </a:extLst>
           </p:cNvPr>
@@ -4077,62 +4729,774 @@
             <p:ph type="title"/>
           </p:nvPr>
         </p:nvSpPr>
-        <p:spPr/>
+        <p:spPr>
+          <a:xfrm>
+            <a:off x="663633" y="243536"/>
+            <a:ext cx="11353800" cy="555233"/>
+          </a:xfrm>
+        </p:spPr>
         <p:txBody>
-          <a:bodyPr/>
+          <a:bodyPr>
+            <a:normAutofit fontScale="90000"/>
+          </a:bodyPr>
           <a:lstStyle/>
           <a:p>
             <a:r>
               <a:rPr lang="en-US" dirty="0"/>
-              <a:t>Data Product Business Case</a:t>
-            </a:r>
+              <a:t>The world is changing</a:t>
+            </a:r>
+          </a:p>
+        </p:txBody>
+      </p:sp>
+      <p:pic>
+        <p:nvPicPr>
+          <p:cNvPr id="3074" name="Picture 2" descr="https://external-content.duckduckgo.com/iu/?u=https%3A%2F%2Ftse1.mm.bing.net%2Fth%3Fid%3DOIP.rRikbd2Js4CYSI6VZeJQzwHaFj%26pid%3DApi&amp;f=1">
+            <a:extLst>
+              <a:ext uri="{FF2B5EF4-FFF2-40B4-BE49-F238E27FC236}">
+                <a16:creationId xmlns:a16="http://schemas.microsoft.com/office/drawing/2014/main" id="{EEAC4C7A-2B98-4F19-84D3-FAADD70BB258}"/>
+              </a:ext>
+            </a:extLst>
+          </p:cNvPr>
+          <p:cNvPicPr>
+            <a:picLocks noChangeAspect="1" noChangeArrowheads="1"/>
+          </p:cNvPicPr>
+          <p:nvPr/>
+        </p:nvPicPr>
+        <p:blipFill>
+          <a:blip r:embed="rId2">
+            <a:extLst>
+              <a:ext uri="{28A0092B-C50C-407E-A947-70E740481C1C}">
+                <a14:useLocalDpi xmlns:a14="http://schemas.microsoft.com/office/drawing/2010/main" val="0"/>
+              </a:ext>
+            </a:extLst>
+          </a:blip>
+          <a:srcRect/>
+          <a:stretch>
+            <a:fillRect/>
+          </a:stretch>
+        </p:blipFill>
+        <p:spPr bwMode="auto">
+          <a:xfrm>
+            <a:off x="4814703" y="1464250"/>
+            <a:ext cx="2542433" cy="1904143"/>
+          </a:xfrm>
+          <a:prstGeom prst="rect">
+            <a:avLst/>
+          </a:prstGeom>
+          <a:noFill/>
+          <a:extLst>
+            <a:ext uri="{909E8E84-426E-40DD-AFC4-6F175D3DCCD1}">
+              <a14:hiddenFill xmlns:a14="http://schemas.microsoft.com/office/drawing/2010/main">
+                <a:solidFill>
+                  <a:srgbClr val="FFFFFF"/>
+                </a:solidFill>
+              </a14:hiddenFill>
+            </a:ext>
+          </a:extLst>
+        </p:spPr>
+      </p:pic>
+      <p:pic>
+        <p:nvPicPr>
+          <p:cNvPr id="3076" name="Picture 4" descr="https://external-content.duckduckgo.com/iu/?u=https%3A%2F%2Fyourfirststep.org%2Fwp-content%2Fuploads%2F2016%2F09%2Fcar-map2.jpg&amp;f=1&amp;nofb=1">
+            <a:extLst>
+              <a:ext uri="{FF2B5EF4-FFF2-40B4-BE49-F238E27FC236}">
+                <a16:creationId xmlns:a16="http://schemas.microsoft.com/office/drawing/2014/main" id="{FDD5AD38-BB5E-4A82-ABF7-76B0F35FC075}"/>
+              </a:ext>
+            </a:extLst>
+          </p:cNvPr>
+          <p:cNvPicPr>
+            <a:picLocks noChangeAspect="1" noChangeArrowheads="1"/>
+          </p:cNvPicPr>
+          <p:nvPr/>
+        </p:nvPicPr>
+        <p:blipFill>
+          <a:blip r:embed="rId3">
+            <a:extLst>
+              <a:ext uri="{28A0092B-C50C-407E-A947-70E740481C1C}">
+                <a14:useLocalDpi xmlns:a14="http://schemas.microsoft.com/office/drawing/2010/main" val="0"/>
+              </a:ext>
+            </a:extLst>
+          </a:blip>
+          <a:srcRect/>
+          <a:stretch>
+            <a:fillRect/>
+          </a:stretch>
+        </p:blipFill>
+        <p:spPr bwMode="auto">
+          <a:xfrm>
+            <a:off x="848382" y="1464251"/>
+            <a:ext cx="2542433" cy="1904143"/>
+          </a:xfrm>
+          <a:prstGeom prst="rect">
+            <a:avLst/>
+          </a:prstGeom>
+          <a:noFill/>
+          <a:extLst>
+            <a:ext uri="{909E8E84-426E-40DD-AFC4-6F175D3DCCD1}">
+              <a14:hiddenFill xmlns:a14="http://schemas.microsoft.com/office/drawing/2010/main">
+                <a:solidFill>
+                  <a:srgbClr val="FFFFFF"/>
+                </a:solidFill>
+              </a14:hiddenFill>
+            </a:ext>
+          </a:extLst>
+        </p:spPr>
+      </p:pic>
+      <p:pic>
+        <p:nvPicPr>
+          <p:cNvPr id="3" name="Picture 2">
+            <a:extLst>
+              <a:ext uri="{FF2B5EF4-FFF2-40B4-BE49-F238E27FC236}">
+                <a16:creationId xmlns:a16="http://schemas.microsoft.com/office/drawing/2014/main" id="{91C551D1-200A-45D8-99AF-A25DFCC63891}"/>
+              </a:ext>
+            </a:extLst>
+          </p:cNvPr>
+          <p:cNvPicPr>
+            <a:picLocks noChangeAspect="1"/>
+          </p:cNvPicPr>
+          <p:nvPr/>
+        </p:nvPicPr>
+        <p:blipFill>
+          <a:blip r:embed="rId4"/>
+          <a:stretch>
+            <a:fillRect/>
+          </a:stretch>
+        </p:blipFill>
+        <p:spPr>
+          <a:xfrm>
+            <a:off x="8781027" y="1464251"/>
+            <a:ext cx="2747340" cy="1904143"/>
+          </a:xfrm>
+          <a:prstGeom prst="rect">
+            <a:avLst/>
+          </a:prstGeom>
+        </p:spPr>
+      </p:pic>
+      <p:sp>
+        <p:nvSpPr>
+          <p:cNvPr id="27" name="Arrow: Right 26">
+            <a:extLst>
+              <a:ext uri="{FF2B5EF4-FFF2-40B4-BE49-F238E27FC236}">
+                <a16:creationId xmlns:a16="http://schemas.microsoft.com/office/drawing/2014/main" id="{1AF8BA7B-C830-4A0C-ABC8-AE2473C81342}"/>
+              </a:ext>
+            </a:extLst>
+          </p:cNvPr>
+          <p:cNvSpPr/>
+          <p:nvPr/>
+        </p:nvSpPr>
+        <p:spPr>
+          <a:xfrm>
+            <a:off x="3749120" y="1979837"/>
+            <a:ext cx="762000" cy="863600"/>
+          </a:xfrm>
+          <a:prstGeom prst="rightArrow">
+            <a:avLst/>
+          </a:prstGeom>
+          <a:solidFill>
+            <a:schemeClr val="bg2">
+              <a:lumMod val="25000"/>
+            </a:schemeClr>
+          </a:solidFill>
+          <a:ln>
+            <a:noFill/>
+          </a:ln>
+        </p:spPr>
+        <p:style>
+          <a:lnRef idx="2">
+            <a:schemeClr val="accent1">
+              <a:shade val="50000"/>
+            </a:schemeClr>
+          </a:lnRef>
+          <a:fillRef idx="1">
+            <a:schemeClr val="accent1"/>
+          </a:fillRef>
+          <a:effectRef idx="0">
+            <a:schemeClr val="accent1"/>
+          </a:effectRef>
+          <a:fontRef idx="minor">
+            <a:schemeClr val="lt1"/>
+          </a:fontRef>
+        </p:style>
+        <p:txBody>
+          <a:bodyPr rtlCol="0" anchor="ctr"/>
+          <a:lstStyle/>
+          <a:p>
+            <a:pPr algn="ctr"/>
+            <a:endParaRPr lang="en-US" dirty="0"/>
           </a:p>
         </p:txBody>
       </p:sp>
       <p:sp>
         <p:nvSpPr>
-          <p:cNvPr id="3" name="Text Placeholder 2">
-            <a:extLst>
-              <a:ext uri="{FF2B5EF4-FFF2-40B4-BE49-F238E27FC236}">
-                <a16:creationId xmlns:a16="http://schemas.microsoft.com/office/drawing/2014/main" id="{878F4A27-137F-4929-9134-CFC1C02A743A}"/>
-              </a:ext>
-            </a:extLst>
-          </p:cNvPr>
-          <p:cNvSpPr>
-            <a:spLocks noGrp="1"/>
-          </p:cNvSpPr>
-          <p:nvPr>
-            <p:ph type="body" idx="1"/>
-          </p:nvPr>
+          <p:cNvPr id="31" name="Arrow: Right 30">
+            <a:extLst>
+              <a:ext uri="{FF2B5EF4-FFF2-40B4-BE49-F238E27FC236}">
+                <a16:creationId xmlns:a16="http://schemas.microsoft.com/office/drawing/2014/main" id="{7D65AEFA-DFB5-4CAC-9E57-C9CD36B40AA8}"/>
+              </a:ext>
+            </a:extLst>
+          </p:cNvPr>
+          <p:cNvSpPr/>
+          <p:nvPr/>
         </p:nvSpPr>
-        <p:spPr/>
+        <p:spPr>
+          <a:xfrm>
+            <a:off x="7688081" y="1979837"/>
+            <a:ext cx="762000" cy="863600"/>
+          </a:xfrm>
+          <a:prstGeom prst="rightArrow">
+            <a:avLst/>
+          </a:prstGeom>
+          <a:solidFill>
+            <a:schemeClr val="bg2">
+              <a:lumMod val="25000"/>
+            </a:schemeClr>
+          </a:solidFill>
+          <a:ln>
+            <a:noFill/>
+          </a:ln>
+        </p:spPr>
+        <p:style>
+          <a:lnRef idx="2">
+            <a:schemeClr val="accent1">
+              <a:shade val="50000"/>
+            </a:schemeClr>
+          </a:lnRef>
+          <a:fillRef idx="1">
+            <a:schemeClr val="accent1"/>
+          </a:fillRef>
+          <a:effectRef idx="0">
+            <a:schemeClr val="accent1"/>
+          </a:effectRef>
+          <a:fontRef idx="minor">
+            <a:schemeClr val="lt1"/>
+          </a:fontRef>
+        </p:style>
         <p:txBody>
-          <a:bodyPr/>
+          <a:bodyPr rtlCol="0" anchor="ctr"/>
           <a:lstStyle/>
           <a:p>
+            <a:pPr algn="ctr"/>
+            <a:endParaRPr lang="en-US" dirty="0"/>
+          </a:p>
+        </p:txBody>
+      </p:sp>
+      <p:sp>
+        <p:nvSpPr>
+          <p:cNvPr id="33" name="Arrow: Right 32">
+            <a:extLst>
+              <a:ext uri="{FF2B5EF4-FFF2-40B4-BE49-F238E27FC236}">
+                <a16:creationId xmlns:a16="http://schemas.microsoft.com/office/drawing/2014/main" id="{7CC84945-CA9F-4CD4-93CF-099294F6D315}"/>
+              </a:ext>
+            </a:extLst>
+          </p:cNvPr>
+          <p:cNvSpPr/>
+          <p:nvPr/>
+        </p:nvSpPr>
+        <p:spPr>
+          <a:xfrm>
+            <a:off x="848382" y="798769"/>
+            <a:ext cx="10679985" cy="665481"/>
+          </a:xfrm>
+          <a:prstGeom prst="rightArrow">
+            <a:avLst/>
+          </a:prstGeom>
+          <a:solidFill>
+            <a:schemeClr val="bg2">
+              <a:lumMod val="25000"/>
+            </a:schemeClr>
+          </a:solidFill>
+          <a:ln>
+            <a:noFill/>
+          </a:ln>
+        </p:spPr>
+        <p:style>
+          <a:lnRef idx="2">
+            <a:schemeClr val="accent1">
+              <a:shade val="50000"/>
+            </a:schemeClr>
+          </a:lnRef>
+          <a:fillRef idx="1">
+            <a:schemeClr val="accent1"/>
+          </a:fillRef>
+          <a:effectRef idx="0">
+            <a:schemeClr val="accent1"/>
+          </a:effectRef>
+          <a:fontRef idx="minor">
+            <a:schemeClr val="lt1"/>
+          </a:fontRef>
+        </p:style>
+        <p:txBody>
+          <a:bodyPr rtlCol="0" anchor="ctr"/>
+          <a:lstStyle/>
+          <a:p>
+            <a:pPr algn="ctr"/>
+            <a:r>
+              <a:rPr lang="en-US" b="1" dirty="0"/>
+              <a:t>Increasing data content</a:t>
+            </a:r>
+          </a:p>
+        </p:txBody>
+      </p:sp>
+      <p:pic>
+        <p:nvPicPr>
+          <p:cNvPr id="30" name="Picture 29">
+            <a:extLst>
+              <a:ext uri="{FF2B5EF4-FFF2-40B4-BE49-F238E27FC236}">
+                <a16:creationId xmlns:a16="http://schemas.microsoft.com/office/drawing/2014/main" id="{A6554A58-49B0-47AC-81B4-7F5593A6DB48}"/>
+              </a:ext>
+            </a:extLst>
+          </p:cNvPr>
+          <p:cNvPicPr>
+            <a:picLocks noChangeAspect="1"/>
+          </p:cNvPicPr>
+          <p:nvPr/>
+        </p:nvPicPr>
+        <p:blipFill>
+          <a:blip r:embed="rId5"/>
+          <a:stretch>
+            <a:fillRect/>
+          </a:stretch>
+        </p:blipFill>
+        <p:spPr>
+          <a:xfrm>
+            <a:off x="848381" y="4183367"/>
+            <a:ext cx="2542433" cy="1904143"/>
+          </a:xfrm>
+          <a:prstGeom prst="rect">
+            <a:avLst/>
+          </a:prstGeom>
+        </p:spPr>
+      </p:pic>
+      <p:sp>
+        <p:nvSpPr>
+          <p:cNvPr id="32" name="Rectangle 31">
+            <a:extLst>
+              <a:ext uri="{FF2B5EF4-FFF2-40B4-BE49-F238E27FC236}">
+                <a16:creationId xmlns:a16="http://schemas.microsoft.com/office/drawing/2014/main" id="{6241314C-BDF7-4C61-8946-4EA8552A41B4}"/>
+              </a:ext>
+            </a:extLst>
+          </p:cNvPr>
+          <p:cNvSpPr/>
+          <p:nvPr/>
+        </p:nvSpPr>
+        <p:spPr>
+          <a:xfrm>
+            <a:off x="848381" y="3749735"/>
+            <a:ext cx="2542433" cy="405353"/>
+          </a:xfrm>
+          <a:prstGeom prst="rect">
+            <a:avLst/>
+          </a:prstGeom>
+          <a:solidFill>
+            <a:schemeClr val="bg2">
+              <a:lumMod val="25000"/>
+            </a:schemeClr>
+          </a:solidFill>
+          <a:ln>
+            <a:noFill/>
+          </a:ln>
+        </p:spPr>
+        <p:style>
+          <a:lnRef idx="2">
+            <a:schemeClr val="accent1">
+              <a:shade val="50000"/>
+            </a:schemeClr>
+          </a:lnRef>
+          <a:fillRef idx="1">
+            <a:schemeClr val="accent1"/>
+          </a:fillRef>
+          <a:effectRef idx="0">
+            <a:schemeClr val="accent1"/>
+          </a:effectRef>
+          <a:fontRef idx="minor">
+            <a:schemeClr val="lt1"/>
+          </a:fontRef>
+        </p:style>
+        <p:txBody>
+          <a:bodyPr rtlCol="0" anchor="ctr"/>
+          <a:lstStyle/>
+          <a:p>
+            <a:pPr algn="ctr"/>
             <a:r>
               <a:rPr lang="en-US" dirty="0"/>
-              <a:t>Bonus Incentive Plans</a:t>
-            </a:r>
-          </a:p>
-          <a:p>
+              <a:t>Too much data!</a:t>
+            </a:r>
+          </a:p>
+        </p:txBody>
+      </p:sp>
+      <p:sp>
+        <p:nvSpPr>
+          <p:cNvPr id="36" name="Rectangle 35">
+            <a:extLst>
+              <a:ext uri="{FF2B5EF4-FFF2-40B4-BE49-F238E27FC236}">
+                <a16:creationId xmlns:a16="http://schemas.microsoft.com/office/drawing/2014/main" id="{4893D84F-EF7D-4BB1-A5DD-5391276B78ED}"/>
+              </a:ext>
+            </a:extLst>
+          </p:cNvPr>
+          <p:cNvSpPr/>
+          <p:nvPr/>
+        </p:nvSpPr>
+        <p:spPr>
+          <a:xfrm>
+            <a:off x="3543486" y="3749734"/>
+            <a:ext cx="2542433" cy="2309497"/>
+          </a:xfrm>
+          <a:prstGeom prst="rect">
+            <a:avLst/>
+          </a:prstGeom>
+          <a:solidFill>
+            <a:schemeClr val="bg2">
+              <a:lumMod val="25000"/>
+            </a:schemeClr>
+          </a:solidFill>
+          <a:ln>
+            <a:noFill/>
+          </a:ln>
+        </p:spPr>
+        <p:style>
+          <a:lnRef idx="2">
+            <a:schemeClr val="accent1">
+              <a:shade val="50000"/>
+            </a:schemeClr>
+          </a:lnRef>
+          <a:fillRef idx="1">
+            <a:schemeClr val="accent1"/>
+          </a:fillRef>
+          <a:effectRef idx="0">
+            <a:schemeClr val="accent1"/>
+          </a:effectRef>
+          <a:fontRef idx="minor">
+            <a:schemeClr val="lt1"/>
+          </a:fontRef>
+        </p:style>
+        <p:txBody>
+          <a:bodyPr rtlCol="0" anchor="ctr"/>
+          <a:lstStyle/>
+          <a:p>
+            <a:pPr marL="285750" indent="-285750" algn="just">
+              <a:buFont typeface="Arial" panose="020B0604020202020204" pitchFamily="34" charset="0"/>
+              <a:buChar char="•"/>
+            </a:pPr>
             <a:r>
               <a:rPr lang="en-US" dirty="0"/>
-              <a:t>~1,000 participants</a:t>
-            </a:r>
-          </a:p>
-          <a:p>
+              <a:t>Automation</a:t>
+            </a:r>
+          </a:p>
+          <a:p>
+            <a:pPr marL="285750" indent="-285750" algn="just">
+              <a:buFont typeface="Arial" panose="020B0604020202020204" pitchFamily="34" charset="0"/>
+              <a:buChar char="•"/>
+            </a:pPr>
+            <a:endParaRPr lang="en-US" dirty="0"/>
+          </a:p>
+          <a:p>
+            <a:pPr marL="285750" indent="-285750" algn="just">
+              <a:buFont typeface="Arial" panose="020B0604020202020204" pitchFamily="34" charset="0"/>
+              <a:buChar char="•"/>
+            </a:pPr>
             <a:r>
               <a:rPr lang="en-US" dirty="0"/>
-              <a:t>$$ costs in the millions</a:t>
-            </a:r>
+              <a:t>“Big” data (= does not fit in Excel)</a:t>
+            </a:r>
+          </a:p>
+          <a:p>
+            <a:pPr marL="285750" indent="-285750" algn="just">
+              <a:buFont typeface="Arial" panose="020B0604020202020204" pitchFamily="34" charset="0"/>
+              <a:buChar char="•"/>
+            </a:pPr>
+            <a:endParaRPr lang="en-US" dirty="0"/>
+          </a:p>
+          <a:p>
+            <a:pPr marL="285750" indent="-285750" algn="just">
+              <a:buFont typeface="Arial" panose="020B0604020202020204" pitchFamily="34" charset="0"/>
+              <a:buChar char="•"/>
+            </a:pPr>
+            <a:r>
+              <a:rPr lang="en-US" b="1" u="sng" dirty="0"/>
+              <a:t>Communication</a:t>
+            </a:r>
+          </a:p>
+          <a:p>
+            <a:pPr marL="285750" indent="-285750" algn="just">
+              <a:buFont typeface="Arial" panose="020B0604020202020204" pitchFamily="34" charset="0"/>
+              <a:buChar char="•"/>
+            </a:pPr>
+            <a:endParaRPr lang="en-US" dirty="0"/>
+          </a:p>
+        </p:txBody>
+      </p:sp>
+      <p:sp>
+        <p:nvSpPr>
+          <p:cNvPr id="13" name="Rectangle 12">
+            <a:extLst>
+              <a:ext uri="{FF2B5EF4-FFF2-40B4-BE49-F238E27FC236}">
+                <a16:creationId xmlns:a16="http://schemas.microsoft.com/office/drawing/2014/main" id="{F26469A8-AEEF-402E-BDB2-6E73AF5FED58}"/>
+              </a:ext>
+            </a:extLst>
+          </p:cNvPr>
+          <p:cNvSpPr/>
+          <p:nvPr/>
+        </p:nvSpPr>
+        <p:spPr>
+          <a:xfrm>
+            <a:off x="6290829" y="3721456"/>
+            <a:ext cx="2542433" cy="405353"/>
+          </a:xfrm>
+          <a:prstGeom prst="rect">
+            <a:avLst/>
+          </a:prstGeom>
+          <a:solidFill>
+            <a:schemeClr val="bg2">
+              <a:lumMod val="25000"/>
+            </a:schemeClr>
+          </a:solidFill>
+          <a:ln>
+            <a:noFill/>
+          </a:ln>
+        </p:spPr>
+        <p:style>
+          <a:lnRef idx="2">
+            <a:schemeClr val="accent1">
+              <a:shade val="50000"/>
+            </a:schemeClr>
+          </a:lnRef>
+          <a:fillRef idx="1">
+            <a:schemeClr val="accent1"/>
+          </a:fillRef>
+          <a:effectRef idx="0">
+            <a:schemeClr val="accent1"/>
+          </a:effectRef>
+          <a:fontRef idx="minor">
+            <a:schemeClr val="lt1"/>
+          </a:fontRef>
+        </p:style>
+        <p:txBody>
+          <a:bodyPr rtlCol="0" anchor="ctr"/>
+          <a:lstStyle/>
+          <a:p>
+            <a:pPr algn="ctr"/>
+            <a:r>
+              <a:rPr lang="en-US" dirty="0"/>
+              <a:t>Enterprise tooling</a:t>
+            </a:r>
+          </a:p>
+        </p:txBody>
+      </p:sp>
+      <p:sp>
+        <p:nvSpPr>
+          <p:cNvPr id="14" name="Rectangle 13">
+            <a:extLst>
+              <a:ext uri="{FF2B5EF4-FFF2-40B4-BE49-F238E27FC236}">
+                <a16:creationId xmlns:a16="http://schemas.microsoft.com/office/drawing/2014/main" id="{7B35BC40-8306-49FF-96BB-CB91F774C923}"/>
+              </a:ext>
+            </a:extLst>
+          </p:cNvPr>
+          <p:cNvSpPr/>
+          <p:nvPr/>
+        </p:nvSpPr>
+        <p:spPr>
+          <a:xfrm>
+            <a:off x="8985934" y="3721455"/>
+            <a:ext cx="2542433" cy="2309497"/>
+          </a:xfrm>
+          <a:prstGeom prst="rect">
+            <a:avLst/>
+          </a:prstGeom>
+          <a:solidFill>
+            <a:schemeClr val="bg2">
+              <a:lumMod val="25000"/>
+            </a:schemeClr>
+          </a:solidFill>
+          <a:ln>
+            <a:noFill/>
+          </a:ln>
+        </p:spPr>
+        <p:style>
+          <a:lnRef idx="2">
+            <a:schemeClr val="accent1">
+              <a:shade val="50000"/>
+            </a:schemeClr>
+          </a:lnRef>
+          <a:fillRef idx="1">
+            <a:schemeClr val="accent1"/>
+          </a:fillRef>
+          <a:effectRef idx="0">
+            <a:schemeClr val="accent1"/>
+          </a:effectRef>
+          <a:fontRef idx="minor">
+            <a:schemeClr val="lt1"/>
+          </a:fontRef>
+        </p:style>
+        <p:txBody>
+          <a:bodyPr rtlCol="0" anchor="ctr"/>
+          <a:lstStyle/>
+          <a:p>
+            <a:pPr algn="just"/>
+            <a:endParaRPr lang="en-US" dirty="0"/>
+          </a:p>
+          <a:p>
+            <a:pPr algn="just"/>
+            <a:r>
+              <a:rPr lang="en-US" dirty="0"/>
+              <a:t>Pros</a:t>
+            </a:r>
+          </a:p>
+          <a:p>
+            <a:pPr marL="285750" indent="-285750" algn="just">
+              <a:buFont typeface="Arial" panose="020B0604020202020204" pitchFamily="34" charset="0"/>
+              <a:buChar char="•"/>
+            </a:pPr>
+            <a:r>
+              <a:rPr lang="en-US" dirty="0"/>
+              <a:t>Supported</a:t>
+            </a:r>
+          </a:p>
+          <a:p>
+            <a:pPr marL="285750" indent="-285750" algn="just">
+              <a:buFont typeface="Arial" panose="020B0604020202020204" pitchFamily="34" charset="0"/>
+              <a:buChar char="•"/>
+            </a:pPr>
+            <a:r>
+              <a:rPr lang="en-US" dirty="0"/>
+              <a:t>UIs</a:t>
+            </a:r>
+          </a:p>
+          <a:p>
+            <a:pPr algn="just"/>
+            <a:endParaRPr lang="en-US" dirty="0"/>
+          </a:p>
+          <a:p>
+            <a:pPr algn="just"/>
+            <a:r>
+              <a:rPr lang="en-US" dirty="0"/>
+              <a:t>Cons:</a:t>
+            </a:r>
+          </a:p>
+          <a:p>
+            <a:pPr marL="285750" indent="-285750" algn="just">
+              <a:buFont typeface="Arial" panose="020B0604020202020204" pitchFamily="34" charset="0"/>
+              <a:buChar char="•"/>
+            </a:pPr>
+            <a:r>
+              <a:rPr lang="en-US" dirty="0"/>
+              <a:t>Expensive</a:t>
+            </a:r>
+          </a:p>
+          <a:p>
+            <a:pPr marL="285750" indent="-285750" algn="just">
+              <a:buFont typeface="Arial" panose="020B0604020202020204" pitchFamily="34" charset="0"/>
+              <a:buChar char="•"/>
+            </a:pPr>
+            <a:r>
+              <a:rPr lang="en-US" dirty="0"/>
+              <a:t>Hard to scale</a:t>
+            </a:r>
+          </a:p>
+          <a:p>
+            <a:pPr marL="285750" indent="-285750" algn="just">
+              <a:buFont typeface="Arial" panose="020B0604020202020204" pitchFamily="34" charset="0"/>
+              <a:buChar char="•"/>
+            </a:pPr>
+            <a:r>
+              <a:rPr lang="en-US" b="1" dirty="0"/>
+              <a:t>Edge cases</a:t>
+            </a:r>
+          </a:p>
+          <a:p>
+            <a:pPr marL="285750" indent="-285750" algn="just">
+              <a:buFont typeface="Arial" panose="020B0604020202020204" pitchFamily="34" charset="0"/>
+              <a:buChar char="•"/>
+            </a:pPr>
+            <a:endParaRPr lang="en-US" dirty="0"/>
+          </a:p>
+        </p:txBody>
+      </p:sp>
+      <p:pic>
+        <p:nvPicPr>
+          <p:cNvPr id="4" name="Picture 3">
+            <a:extLst>
+              <a:ext uri="{FF2B5EF4-FFF2-40B4-BE49-F238E27FC236}">
+                <a16:creationId xmlns:a16="http://schemas.microsoft.com/office/drawing/2014/main" id="{E7E791C2-5F3C-471F-98DB-A6FC31D83730}"/>
+              </a:ext>
+            </a:extLst>
+          </p:cNvPr>
+          <p:cNvPicPr>
+            <a:picLocks noChangeAspect="1"/>
+          </p:cNvPicPr>
+          <p:nvPr/>
+        </p:nvPicPr>
+        <p:blipFill>
+          <a:blip r:embed="rId6"/>
+          <a:stretch>
+            <a:fillRect/>
+          </a:stretch>
+        </p:blipFill>
+        <p:spPr>
+          <a:xfrm>
+            <a:off x="6290829" y="4276745"/>
+            <a:ext cx="2542433" cy="1754207"/>
+          </a:xfrm>
+          <a:prstGeom prst="rect">
+            <a:avLst/>
+          </a:prstGeom>
+        </p:spPr>
+      </p:pic>
+      <p:sp>
+        <p:nvSpPr>
+          <p:cNvPr id="5" name="Rectangle 4">
+            <a:extLst>
+              <a:ext uri="{FF2B5EF4-FFF2-40B4-BE49-F238E27FC236}">
+                <a16:creationId xmlns:a16="http://schemas.microsoft.com/office/drawing/2014/main" id="{6649AC86-5635-4AB4-B607-9B4AD3FA599C}"/>
+              </a:ext>
+            </a:extLst>
+          </p:cNvPr>
+          <p:cNvSpPr/>
+          <p:nvPr/>
+        </p:nvSpPr>
+        <p:spPr>
+          <a:xfrm>
+            <a:off x="6202837" y="3638746"/>
+            <a:ext cx="5420412" cy="2448764"/>
+          </a:xfrm>
+          <a:prstGeom prst="rect">
+            <a:avLst/>
+          </a:prstGeom>
+          <a:noFill/>
+          <a:ln w="38100">
+            <a:solidFill>
+              <a:srgbClr val="C00000"/>
+            </a:solidFill>
+          </a:ln>
+        </p:spPr>
+        <p:style>
+          <a:lnRef idx="2">
+            <a:schemeClr val="accent1">
+              <a:shade val="50000"/>
+            </a:schemeClr>
+          </a:lnRef>
+          <a:fillRef idx="1">
+            <a:schemeClr val="accent1"/>
+          </a:fillRef>
+          <a:effectRef idx="0">
+            <a:schemeClr val="accent1"/>
+          </a:effectRef>
+          <a:fontRef idx="minor">
+            <a:schemeClr val="lt1"/>
+          </a:fontRef>
+        </p:style>
+        <p:txBody>
+          <a:bodyPr rtlCol="0" anchor="ctr"/>
+          <a:lstStyle/>
+          <a:p>
+            <a:pPr algn="ctr"/>
+            <a:endParaRPr lang="en-US"/>
           </a:p>
         </p:txBody>
       </p:sp>
     </p:spTree>
     <p:extLst>
       <p:ext uri="{BB962C8B-B14F-4D97-AF65-F5344CB8AC3E}">
-        <p14:creationId xmlns:p14="http://schemas.microsoft.com/office/powerpoint/2010/main" val="2240036738"/>
+        <p14:creationId xmlns:p14="http://schemas.microsoft.com/office/powerpoint/2010/main" val="1735491974"/>
       </p:ext>
     </p:extLst>
   </p:cSld>
@@ -4159,6 +5523,36 @@
           <a:chExt cx="0" cy="0"/>
         </a:xfrm>
       </p:grpSpPr>
+      <p:pic>
+        <p:nvPicPr>
+          <p:cNvPr id="5" name="Picture 4">
+            <a:extLst>
+              <a:ext uri="{FF2B5EF4-FFF2-40B4-BE49-F238E27FC236}">
+                <a16:creationId xmlns:a16="http://schemas.microsoft.com/office/drawing/2014/main" id="{966FC395-7654-4212-98A8-C972A3CC8445}"/>
+              </a:ext>
+            </a:extLst>
+          </p:cNvPr>
+          <p:cNvPicPr>
+            <a:picLocks noChangeAspect="1"/>
+          </p:cNvPicPr>
+          <p:nvPr/>
+        </p:nvPicPr>
+        <p:blipFill>
+          <a:blip r:embed="rId2"/>
+          <a:stretch>
+            <a:fillRect/>
+          </a:stretch>
+        </p:blipFill>
+        <p:spPr>
+          <a:xfrm>
+            <a:off x="3559710" y="798769"/>
+            <a:ext cx="5479642" cy="2647704"/>
+          </a:xfrm>
+          <a:prstGeom prst="rect">
+            <a:avLst/>
+          </a:prstGeom>
+        </p:spPr>
+      </p:pic>
       <p:sp>
         <p:nvSpPr>
           <p:cNvPr id="2" name="Title 1">
@@ -4177,7 +5571,7 @@
         </p:nvSpPr>
         <p:spPr>
           <a:xfrm>
-            <a:off x="663633" y="243536"/>
+            <a:off x="622631" y="350241"/>
             <a:ext cx="11353800" cy="555233"/>
           </a:xfrm>
         </p:spPr>
@@ -4189,17 +5583,25 @@
           <a:p>
             <a:r>
               <a:rPr lang="en-US" dirty="0"/>
-              <a:t>Calculating Bonus Plans for ~1,000 people world wide</a:t>
+              <a:t>Python &amp; SQL </a:t>
+            </a:r>
+            <a:r>
+              <a:rPr lang="en-US" b="1" dirty="0"/>
+              <a:t>open source </a:t>
+            </a:r>
+            <a:r>
+              <a:rPr lang="en-US" dirty="0"/>
+              <a:t>data ecosystem to the rescue</a:t>
             </a:r>
           </a:p>
         </p:txBody>
       </p:sp>
       <p:sp>
         <p:nvSpPr>
-          <p:cNvPr id="4" name="Isosceles Triangle 3">
-            <a:extLst>
-              <a:ext uri="{FF2B5EF4-FFF2-40B4-BE49-F238E27FC236}">
-                <a16:creationId xmlns:a16="http://schemas.microsoft.com/office/drawing/2014/main" id="{B01F635F-E093-4CBE-91D9-47271D7CFF0C}"/>
+          <p:cNvPr id="14" name="Rectangle 13">
+            <a:extLst>
+              <a:ext uri="{FF2B5EF4-FFF2-40B4-BE49-F238E27FC236}">
+                <a16:creationId xmlns:a16="http://schemas.microsoft.com/office/drawing/2014/main" id="{7B35BC40-8306-49FF-96BB-CB91F774C923}"/>
               </a:ext>
             </a:extLst>
           </p:cNvPr>
@@ -4207,17 +5609,17 @@
           <p:nvPr/>
         </p:nvSpPr>
         <p:spPr>
-          <a:xfrm rot="5400000">
-            <a:off x="2777144" y="-614154"/>
-            <a:ext cx="5486400" cy="8727658"/>
-          </a:xfrm>
-          <a:prstGeom prst="triangle">
-            <a:avLst>
-              <a:gd name="adj" fmla="val 49497"/>
-            </a:avLst>
+          <a:xfrm>
+            <a:off x="9014214" y="1119502"/>
+            <a:ext cx="2542433" cy="5353951"/>
+          </a:xfrm>
+          <a:prstGeom prst="rect">
+            <a:avLst/>
           </a:prstGeom>
           <a:solidFill>
-            <a:schemeClr val="bg2"/>
+            <a:schemeClr val="bg2">
+              <a:lumMod val="25000"/>
+            </a:schemeClr>
           </a:solidFill>
           <a:ln>
             <a:noFill/>
@@ -4243,134 +5645,156 @@
           <a:bodyPr rtlCol="0" anchor="ctr"/>
           <a:lstStyle/>
           <a:p>
-            <a:pPr algn="ctr"/>
-            <a:endParaRPr lang="en-US">
-              <a:latin typeface="+mj-lt"/>
-            </a:endParaRPr>
-          </a:p>
-        </p:txBody>
-      </p:sp>
-      <p:sp>
-        <p:nvSpPr>
-          <p:cNvPr id="5" name="TextBox 4">
-            <a:extLst>
-              <a:ext uri="{FF2B5EF4-FFF2-40B4-BE49-F238E27FC236}">
-                <a16:creationId xmlns:a16="http://schemas.microsoft.com/office/drawing/2014/main" id="{F0F46B08-5A02-461F-900C-8554A11FDD92}"/>
-              </a:ext>
-            </a:extLst>
-          </p:cNvPr>
-          <p:cNvSpPr txBox="1"/>
-          <p:nvPr/>
-        </p:nvSpPr>
-        <p:spPr>
-          <a:xfrm>
-            <a:off x="2375120" y="2009291"/>
-            <a:ext cx="1633012" cy="461665"/>
-          </a:xfrm>
-          <a:prstGeom prst="rect">
-            <a:avLst/>
-          </a:prstGeom>
-          <a:noFill/>
-        </p:spPr>
-        <p:txBody>
-          <a:bodyPr wrap="square" rtlCol="0">
-            <a:spAutoFit/>
-          </a:bodyPr>
-          <a:lstStyle/>
-          <a:p>
-            <a:r>
-              <a:rPr lang="en-US" sz="1200" b="1" dirty="0">
-                <a:solidFill>
-                  <a:schemeClr val="tx2">
-                    <a:lumMod val="75000"/>
-                  </a:schemeClr>
-                </a:solidFill>
-              </a:rPr>
-              <a:t>TED Indirect Sales</a:t>
-            </a:r>
-            <a:endParaRPr lang="pl-PL" sz="1200" b="1" dirty="0">
-              <a:solidFill>
-                <a:schemeClr val="tx2">
-                  <a:lumMod val="75000"/>
-                </a:schemeClr>
-              </a:solidFill>
-            </a:endParaRPr>
-          </a:p>
-          <a:p>
-            <a:r>
-              <a:rPr lang="en-US" sz="1200" b="1" dirty="0">
-                <a:solidFill>
-                  <a:schemeClr val="tx2">
-                    <a:lumMod val="75000"/>
-                  </a:schemeClr>
-                </a:solidFill>
-              </a:rPr>
-              <a:t>TED Direct Sales</a:t>
-            </a:r>
-            <a:endParaRPr lang="pl-PL" sz="1200" b="1" dirty="0">
-              <a:solidFill>
-                <a:schemeClr val="tx2">
-                  <a:lumMod val="75000"/>
-                </a:schemeClr>
-              </a:solidFill>
-            </a:endParaRPr>
-          </a:p>
-        </p:txBody>
-      </p:sp>
-      <p:sp>
-        <p:nvSpPr>
-          <p:cNvPr id="6" name="TextBox 5">
-            <a:extLst>
-              <a:ext uri="{FF2B5EF4-FFF2-40B4-BE49-F238E27FC236}">
-                <a16:creationId xmlns:a16="http://schemas.microsoft.com/office/drawing/2014/main" id="{EEA8D49B-085A-4B7D-83DF-EEF72AB30FCC}"/>
-              </a:ext>
-            </a:extLst>
-          </p:cNvPr>
-          <p:cNvSpPr txBox="1"/>
-          <p:nvPr/>
-        </p:nvSpPr>
-        <p:spPr>
-          <a:xfrm>
-            <a:off x="2333747" y="5194881"/>
-            <a:ext cx="1633012" cy="461665"/>
-          </a:xfrm>
-          <a:prstGeom prst="rect">
-            <a:avLst/>
-          </a:prstGeom>
-          <a:noFill/>
-        </p:spPr>
-        <p:txBody>
-          <a:bodyPr wrap="square" rtlCol="0">
-            <a:spAutoFit/>
-          </a:bodyPr>
-          <a:lstStyle/>
-          <a:p>
-            <a:r>
-              <a:rPr lang="en-US" sz="1200" b="1" dirty="0">
-                <a:solidFill>
-                  <a:schemeClr val="tx2">
-                    <a:lumMod val="75000"/>
-                  </a:schemeClr>
-                </a:solidFill>
-              </a:rPr>
-              <a:t>Salesforce pipeline and conversion</a:t>
-            </a:r>
-            <a:endParaRPr lang="pl-PL" sz="1200" b="1" dirty="0">
-              <a:solidFill>
-                <a:schemeClr val="tx2">
-                  <a:lumMod val="75000"/>
-                </a:schemeClr>
-              </a:solidFill>
-            </a:endParaRPr>
+            <a:pPr algn="just"/>
+            <a:r>
+              <a:rPr lang="en-US" dirty="0"/>
+              <a:t>Pros</a:t>
+            </a:r>
+          </a:p>
+          <a:p>
+            <a:pPr marL="285750" indent="-285750" algn="just">
+              <a:buFont typeface="Arial" panose="020B0604020202020204" pitchFamily="34" charset="0"/>
+              <a:buChar char="•"/>
+            </a:pPr>
+            <a:r>
+              <a:rPr lang="en-US" dirty="0"/>
+              <a:t>Mature</a:t>
+            </a:r>
+          </a:p>
+          <a:p>
+            <a:pPr marL="285750" indent="-285750" algn="just">
+              <a:buFont typeface="Arial" panose="020B0604020202020204" pitchFamily="34" charset="0"/>
+              <a:buChar char="•"/>
+            </a:pPr>
+            <a:endParaRPr lang="en-US" dirty="0"/>
+          </a:p>
+          <a:p>
+            <a:pPr marL="285750" indent="-285750" algn="just">
+              <a:buFont typeface="Arial" panose="020B0604020202020204" pitchFamily="34" charset="0"/>
+              <a:buChar char="•"/>
+            </a:pPr>
+            <a:r>
+              <a:rPr lang="en-US" dirty="0"/>
+              <a:t>Community</a:t>
+            </a:r>
+          </a:p>
+          <a:p>
+            <a:pPr marL="285750" indent="-285750" algn="just">
+              <a:buFont typeface="Arial" panose="020B0604020202020204" pitchFamily="34" charset="0"/>
+              <a:buChar char="•"/>
+            </a:pPr>
+            <a:endParaRPr lang="en-US" dirty="0"/>
+          </a:p>
+          <a:p>
+            <a:pPr marL="285750" indent="-285750" algn="just">
+              <a:buFont typeface="Arial" panose="020B0604020202020204" pitchFamily="34" charset="0"/>
+              <a:buChar char="•"/>
+            </a:pPr>
+            <a:r>
+              <a:rPr lang="en-US" b="1" dirty="0"/>
+              <a:t>Edge cases</a:t>
+            </a:r>
+          </a:p>
+          <a:p>
+            <a:pPr marL="285750" indent="-285750" algn="just">
+              <a:buFont typeface="Arial" panose="020B0604020202020204" pitchFamily="34" charset="0"/>
+              <a:buChar char="•"/>
+            </a:pPr>
+            <a:endParaRPr lang="en-US" b="1" dirty="0"/>
+          </a:p>
+          <a:p>
+            <a:pPr marL="285750" indent="-285750" algn="just">
+              <a:buFont typeface="Arial" panose="020B0604020202020204" pitchFamily="34" charset="0"/>
+              <a:buChar char="•"/>
+            </a:pPr>
+            <a:r>
+              <a:rPr lang="en-US" dirty="0"/>
+              <a:t>Scales</a:t>
+            </a:r>
+          </a:p>
+          <a:p>
+            <a:pPr marL="285750" indent="-285750" algn="just">
+              <a:buFont typeface="Arial" panose="020B0604020202020204" pitchFamily="34" charset="0"/>
+              <a:buChar char="•"/>
+            </a:pPr>
+            <a:endParaRPr lang="en-US" dirty="0"/>
+          </a:p>
+          <a:p>
+            <a:pPr marL="285750" indent="-285750" algn="just">
+              <a:buFont typeface="Arial" panose="020B0604020202020204" pitchFamily="34" charset="0"/>
+              <a:buChar char="•"/>
+            </a:pPr>
+            <a:r>
+              <a:rPr lang="en-US" dirty="0"/>
+              <a:t>Free</a:t>
+            </a:r>
+          </a:p>
+          <a:p>
+            <a:pPr marL="285750" indent="-285750" algn="just">
+              <a:buFont typeface="Arial" panose="020B0604020202020204" pitchFamily="34" charset="0"/>
+              <a:buChar char="•"/>
+            </a:pPr>
+            <a:endParaRPr lang="en-US" dirty="0"/>
+          </a:p>
+          <a:p>
+            <a:pPr algn="just"/>
+            <a:r>
+              <a:rPr lang="en-US" dirty="0"/>
+              <a:t>Cons</a:t>
+            </a:r>
+          </a:p>
+          <a:p>
+            <a:pPr marL="285750" indent="-285750" algn="just">
+              <a:buFont typeface="Arial" panose="020B0604020202020204" pitchFamily="34" charset="0"/>
+              <a:buChar char="•"/>
+            </a:pPr>
+            <a:r>
+              <a:rPr lang="en-US" dirty="0"/>
+              <a:t>Harder to navigate</a:t>
+            </a:r>
+          </a:p>
+          <a:p>
+            <a:pPr marL="285750" indent="-285750" algn="just">
+              <a:buFont typeface="Arial" panose="020B0604020202020204" pitchFamily="34" charset="0"/>
+              <a:buChar char="•"/>
+            </a:pPr>
+            <a:endParaRPr lang="en-US" dirty="0"/>
+          </a:p>
+          <a:p>
+            <a:pPr marL="285750" indent="-285750" algn="just">
+              <a:buFont typeface="Arial" panose="020B0604020202020204" pitchFamily="34" charset="0"/>
+              <a:buChar char="•"/>
+            </a:pPr>
+            <a:r>
+              <a:rPr lang="en-US" dirty="0"/>
+              <a:t>Support</a:t>
+            </a:r>
+          </a:p>
+          <a:p>
+            <a:pPr marL="285750" indent="-285750" algn="just">
+              <a:buFont typeface="Arial" panose="020B0604020202020204" pitchFamily="34" charset="0"/>
+              <a:buChar char="•"/>
+            </a:pPr>
+            <a:endParaRPr lang="en-US" dirty="0"/>
+          </a:p>
+          <a:p>
+            <a:pPr marL="285750" indent="-285750" algn="just">
+              <a:buFont typeface="Arial" panose="020B0604020202020204" pitchFamily="34" charset="0"/>
+              <a:buChar char="•"/>
+            </a:pPr>
+            <a:r>
+              <a:rPr lang="en-US" dirty="0"/>
+              <a:t>GUIs are not that great</a:t>
+            </a:r>
           </a:p>
         </p:txBody>
       </p:sp>
       <p:pic>
         <p:nvPicPr>
-          <p:cNvPr id="7" name="Picture 2" descr="Salesforce.com">
-            <a:extLst>
-              <a:ext uri="{FF2B5EF4-FFF2-40B4-BE49-F238E27FC236}">
-                <a16:creationId xmlns:a16="http://schemas.microsoft.com/office/drawing/2014/main" id="{F2C775C7-AD22-4564-B6A1-50AF5CDD090E}"/>
+          <p:cNvPr id="2050" name="Picture 2" descr="Why Use Python in Scientific Computing? (article) - DataCamp">
+            <a:extLst>
+              <a:ext uri="{FF2B5EF4-FFF2-40B4-BE49-F238E27FC236}">
+                <a16:creationId xmlns:a16="http://schemas.microsoft.com/office/drawing/2014/main" id="{2D1764A1-29CF-40B7-8FAA-324406940088}"/>
               </a:ext>
             </a:extLst>
           </p:cNvPr>
@@ -4379,21 +5803,23 @@
           </p:cNvPicPr>
           <p:nvPr/>
         </p:nvPicPr>
-        <p:blipFill rotWithShape="1">
-          <a:blip r:embed="rId2">
+        <p:blipFill>
+          <a:blip r:embed="rId3">
             <a:extLst>
               <a:ext uri="{28A0092B-C50C-407E-A947-70E740481C1C}">
                 <a14:useLocalDpi xmlns:a14="http://schemas.microsoft.com/office/drawing/2010/main" val="0"/>
               </a:ext>
             </a:extLst>
           </a:blip>
-          <a:srcRect r="47843"/>
-          <a:stretch/>
+          <a:srcRect/>
+          <a:stretch>
+            <a:fillRect/>
+          </a:stretch>
         </p:blipFill>
         <p:spPr bwMode="auto">
           <a:xfrm>
-            <a:off x="1460225" y="5118932"/>
-            <a:ext cx="829800" cy="619125"/>
+            <a:off x="300745" y="2564091"/>
+            <a:ext cx="5082045" cy="3799002"/>
           </a:xfrm>
           <a:prstGeom prst="rect">
             <a:avLst/>
@@ -4410,71 +5836,392 @@
           </a:extLst>
         </p:spPr>
       </p:pic>
-      <p:pic>
-        <p:nvPicPr>
-          <p:cNvPr id="8" name="Picture 7">
-            <a:extLst>
-              <a:ext uri="{FF2B5EF4-FFF2-40B4-BE49-F238E27FC236}">
-                <a16:creationId xmlns:a16="http://schemas.microsoft.com/office/drawing/2014/main" id="{E81282B3-9770-4FF1-8A17-53BE3F8B5EC0}"/>
-              </a:ext>
-            </a:extLst>
-          </p:cNvPr>
-          <p:cNvPicPr>
-            <a:picLocks noChangeAspect="1"/>
-          </p:cNvPicPr>
-          <p:nvPr/>
-        </p:nvPicPr>
-        <p:blipFill>
-          <a:blip r:embed="rId3"/>
-          <a:stretch>
-            <a:fillRect/>
-          </a:stretch>
-        </p:blipFill>
-        <p:spPr>
-          <a:xfrm>
-            <a:off x="1251169" y="2006806"/>
-            <a:ext cx="1072775" cy="390525"/>
+      <p:sp>
+        <p:nvSpPr>
+          <p:cNvPr id="17" name="Rectangle 16">
+            <a:extLst>
+              <a:ext uri="{FF2B5EF4-FFF2-40B4-BE49-F238E27FC236}">
+                <a16:creationId xmlns:a16="http://schemas.microsoft.com/office/drawing/2014/main" id="{31D533DD-514D-4896-8B98-81C1919AA862}"/>
+              </a:ext>
+            </a:extLst>
+          </p:cNvPr>
+          <p:cNvSpPr/>
+          <p:nvPr/>
+        </p:nvSpPr>
+        <p:spPr>
+          <a:xfrm>
+            <a:off x="5269584" y="1904214"/>
+            <a:ext cx="3591612" cy="772998"/>
           </a:xfrm>
           <a:prstGeom prst="rect">
             <a:avLst/>
           </a:prstGeom>
-        </p:spPr>
-      </p:pic>
-      <p:pic>
-        <p:nvPicPr>
-          <p:cNvPr id="9" name="Picture 8">
-            <a:extLst>
-              <a:ext uri="{FF2B5EF4-FFF2-40B4-BE49-F238E27FC236}">
-                <a16:creationId xmlns:a16="http://schemas.microsoft.com/office/drawing/2014/main" id="{A72A8695-F136-48DF-8040-FF95278BB83C}"/>
-              </a:ext>
-            </a:extLst>
-          </p:cNvPr>
-          <p:cNvPicPr>
-            <a:picLocks noChangeAspect="1"/>
-          </p:cNvPicPr>
-          <p:nvPr/>
-        </p:nvPicPr>
-        <p:blipFill rotWithShape="1">
-          <a:blip r:embed="rId4"/>
-          <a:srcRect l="5788"/>
-          <a:stretch/>
-        </p:blipFill>
-        <p:spPr>
-          <a:xfrm>
-            <a:off x="1567378" y="2966582"/>
-            <a:ext cx="625249" cy="409575"/>
+          <a:noFill/>
+          <a:ln w="38100">
+            <a:solidFill>
+              <a:srgbClr val="C00000"/>
+            </a:solidFill>
+          </a:ln>
+        </p:spPr>
+        <p:style>
+          <a:lnRef idx="2">
+            <a:schemeClr val="accent1">
+              <a:shade val="50000"/>
+            </a:schemeClr>
+          </a:lnRef>
+          <a:fillRef idx="1">
+            <a:schemeClr val="accent1"/>
+          </a:fillRef>
+          <a:effectRef idx="0">
+            <a:schemeClr val="accent1"/>
+          </a:effectRef>
+          <a:fontRef idx="minor">
+            <a:schemeClr val="lt1"/>
+          </a:fontRef>
+        </p:style>
+        <p:txBody>
+          <a:bodyPr rtlCol="0" anchor="ctr"/>
+          <a:lstStyle/>
+          <a:p>
+            <a:pPr algn="ctr"/>
+            <a:endParaRPr lang="en-US"/>
+          </a:p>
+        </p:txBody>
+      </p:sp>
+      <p:sp>
+        <p:nvSpPr>
+          <p:cNvPr id="6" name="TextBox 5">
+            <a:extLst>
+              <a:ext uri="{FF2B5EF4-FFF2-40B4-BE49-F238E27FC236}">
+                <a16:creationId xmlns:a16="http://schemas.microsoft.com/office/drawing/2014/main" id="{28EB815E-3DA9-4EA4-810E-994C8F2B8D2E}"/>
+              </a:ext>
+            </a:extLst>
+          </p:cNvPr>
+          <p:cNvSpPr txBox="1"/>
+          <p:nvPr/>
+        </p:nvSpPr>
+        <p:spPr>
+          <a:xfrm>
+            <a:off x="3559710" y="1418390"/>
+            <a:ext cx="2793201" cy="646331"/>
           </a:xfrm>
           <a:prstGeom prst="rect">
             <a:avLst/>
           </a:prstGeom>
-        </p:spPr>
-      </p:pic>
+          <a:noFill/>
+        </p:spPr>
+        <p:txBody>
+          <a:bodyPr wrap="none" rtlCol="0">
+            <a:spAutoFit/>
+          </a:bodyPr>
+          <a:lstStyle/>
+          <a:p>
+            <a:r>
+              <a:rPr lang="en-US" dirty="0"/>
+              <a:t>2019 Stack Overflow Survey</a:t>
+            </a:r>
+          </a:p>
+          <a:p>
+            <a:r>
+              <a:rPr lang="en-US" dirty="0"/>
+              <a:t>Most Popular</a:t>
+            </a:r>
+          </a:p>
+        </p:txBody>
+      </p:sp>
       <p:sp>
         <p:nvSpPr>
-          <p:cNvPr id="10" name="TextBox 9">
-            <a:extLst>
-              <a:ext uri="{FF2B5EF4-FFF2-40B4-BE49-F238E27FC236}">
-                <a16:creationId xmlns:a16="http://schemas.microsoft.com/office/drawing/2014/main" id="{242F4D00-0A1D-4586-BDEF-B3331E282666}"/>
+          <p:cNvPr id="19" name="Rectangle 18">
+            <a:extLst>
+              <a:ext uri="{FF2B5EF4-FFF2-40B4-BE49-F238E27FC236}">
+                <a16:creationId xmlns:a16="http://schemas.microsoft.com/office/drawing/2014/main" id="{3F7CE9A0-2BE0-4C75-8912-952645C21875}"/>
+              </a:ext>
+            </a:extLst>
+          </p:cNvPr>
+          <p:cNvSpPr/>
+          <p:nvPr/>
+        </p:nvSpPr>
+        <p:spPr>
+          <a:xfrm>
+            <a:off x="6017452" y="5420494"/>
+            <a:ext cx="2542433" cy="1052959"/>
+          </a:xfrm>
+          <a:prstGeom prst="rect">
+            <a:avLst/>
+          </a:prstGeom>
+          <a:solidFill>
+            <a:schemeClr val="bg2">
+              <a:lumMod val="75000"/>
+            </a:schemeClr>
+          </a:solidFill>
+          <a:ln>
+            <a:noFill/>
+          </a:ln>
+        </p:spPr>
+        <p:style>
+          <a:lnRef idx="2">
+            <a:schemeClr val="accent1">
+              <a:shade val="50000"/>
+            </a:schemeClr>
+          </a:lnRef>
+          <a:fillRef idx="1">
+            <a:schemeClr val="accent1"/>
+          </a:fillRef>
+          <a:effectRef idx="0">
+            <a:schemeClr val="accent1"/>
+          </a:effectRef>
+          <a:fontRef idx="minor">
+            <a:schemeClr val="lt1"/>
+          </a:fontRef>
+        </p:style>
+        <p:txBody>
+          <a:bodyPr rtlCol="0" anchor="ctr"/>
+          <a:lstStyle/>
+          <a:p>
+            <a:pPr algn="ctr"/>
+            <a:r>
+              <a:rPr lang="en-US" dirty="0"/>
+              <a:t>Best of both worlds?</a:t>
+            </a:r>
+          </a:p>
+          <a:p>
+            <a:pPr algn="ctr"/>
+            <a:endParaRPr lang="en-US" dirty="0"/>
+          </a:p>
+          <a:p>
+            <a:pPr algn="ctr"/>
+            <a:r>
+              <a:rPr lang="en-US" dirty="0"/>
+              <a:t>Enterprise + Open Source</a:t>
+            </a:r>
+          </a:p>
+        </p:txBody>
+      </p:sp>
+    </p:spTree>
+    <p:extLst>
+      <p:ext uri="{BB962C8B-B14F-4D97-AF65-F5344CB8AC3E}">
+        <p14:creationId xmlns:p14="http://schemas.microsoft.com/office/powerpoint/2010/main" val="217881973"/>
+      </p:ext>
+    </p:extLst>
+  </p:cSld>
+  <p:clrMapOvr>
+    <a:masterClrMapping/>
+  </p:clrMapOvr>
+</p:sld>
+</file>
+
+<file path=ppt/slides/slide6.xml><?xml version="1.0" encoding="utf-8"?>
+<p:sld xmlns:a="http://schemas.openxmlformats.org/drawingml/2006/main" xmlns:r="http://schemas.openxmlformats.org/officeDocument/2006/relationships" xmlns:p="http://schemas.openxmlformats.org/presentationml/2006/main">
+  <p:cSld>
+    <p:spTree>
+      <p:nvGrpSpPr>
+        <p:cNvPr id="1" name=""/>
+        <p:cNvGrpSpPr/>
+        <p:nvPr/>
+      </p:nvGrpSpPr>
+      <p:grpSpPr>
+        <a:xfrm>
+          <a:off x="0" y="0"/>
+          <a:ext cx="0" cy="0"/>
+          <a:chOff x="0" y="0"/>
+          <a:chExt cx="0" cy="0"/>
+        </a:xfrm>
+      </p:grpSpPr>
+      <p:sp>
+        <p:nvSpPr>
+          <p:cNvPr id="2" name="Title 1">
+            <a:extLst>
+              <a:ext uri="{FF2B5EF4-FFF2-40B4-BE49-F238E27FC236}">
+                <a16:creationId xmlns:a16="http://schemas.microsoft.com/office/drawing/2014/main" id="{A51387C6-CDCC-4F57-8C2F-434FA96355C1}"/>
+              </a:ext>
+            </a:extLst>
+          </p:cNvPr>
+          <p:cNvSpPr>
+            <a:spLocks noGrp="1"/>
+          </p:cNvSpPr>
+          <p:nvPr>
+            <p:ph type="title"/>
+          </p:nvPr>
+        </p:nvSpPr>
+        <p:spPr/>
+        <p:txBody>
+          <a:bodyPr/>
+          <a:lstStyle/>
+          <a:p>
+            <a:r>
+              <a:rPr lang="en-US" dirty="0"/>
+              <a:t>Data Product Business Case</a:t>
+            </a:r>
+          </a:p>
+        </p:txBody>
+      </p:sp>
+      <p:sp>
+        <p:nvSpPr>
+          <p:cNvPr id="3" name="Text Placeholder 2">
+            <a:extLst>
+              <a:ext uri="{FF2B5EF4-FFF2-40B4-BE49-F238E27FC236}">
+                <a16:creationId xmlns:a16="http://schemas.microsoft.com/office/drawing/2014/main" id="{878F4A27-137F-4929-9134-CFC1C02A743A}"/>
+              </a:ext>
+            </a:extLst>
+          </p:cNvPr>
+          <p:cNvSpPr>
+            <a:spLocks noGrp="1"/>
+          </p:cNvSpPr>
+          <p:nvPr>
+            <p:ph type="body" idx="1"/>
+          </p:nvPr>
+        </p:nvSpPr>
+        <p:spPr/>
+        <p:txBody>
+          <a:bodyPr/>
+          <a:lstStyle/>
+          <a:p>
+            <a:r>
+              <a:rPr lang="en-US" dirty="0"/>
+              <a:t>Bonus Incentive Plans</a:t>
+            </a:r>
+          </a:p>
+          <a:p>
+            <a:r>
+              <a:rPr lang="en-US" dirty="0"/>
+              <a:t>~1,000 participants</a:t>
+            </a:r>
+          </a:p>
+          <a:p>
+            <a:r>
+              <a:rPr lang="en-US" dirty="0"/>
+              <a:t>$$ costs in the millions</a:t>
+            </a:r>
+          </a:p>
+        </p:txBody>
+      </p:sp>
+    </p:spTree>
+    <p:extLst>
+      <p:ext uri="{BB962C8B-B14F-4D97-AF65-F5344CB8AC3E}">
+        <p14:creationId xmlns:p14="http://schemas.microsoft.com/office/powerpoint/2010/main" val="2240036738"/>
+      </p:ext>
+    </p:extLst>
+  </p:cSld>
+  <p:clrMapOvr>
+    <a:masterClrMapping/>
+  </p:clrMapOvr>
+</p:sld>
+</file>
+
+<file path=ppt/slides/slide7.xml><?xml version="1.0" encoding="utf-8"?>
+<p:sld xmlns:a="http://schemas.openxmlformats.org/drawingml/2006/main" xmlns:r="http://schemas.openxmlformats.org/officeDocument/2006/relationships" xmlns:p="http://schemas.openxmlformats.org/presentationml/2006/main">
+  <p:cSld>
+    <p:spTree>
+      <p:nvGrpSpPr>
+        <p:cNvPr id="1" name=""/>
+        <p:cNvGrpSpPr/>
+        <p:nvPr/>
+      </p:nvGrpSpPr>
+      <p:grpSpPr>
+        <a:xfrm>
+          <a:off x="0" y="0"/>
+          <a:ext cx="0" cy="0"/>
+          <a:chOff x="0" y="0"/>
+          <a:chExt cx="0" cy="0"/>
+        </a:xfrm>
+      </p:grpSpPr>
+      <p:sp>
+        <p:nvSpPr>
+          <p:cNvPr id="2" name="Title 1">
+            <a:extLst>
+              <a:ext uri="{FF2B5EF4-FFF2-40B4-BE49-F238E27FC236}">
+                <a16:creationId xmlns:a16="http://schemas.microsoft.com/office/drawing/2014/main" id="{5068025D-663A-40F9-A40B-214B32CD77F1}"/>
+              </a:ext>
+            </a:extLst>
+          </p:cNvPr>
+          <p:cNvSpPr>
+            <a:spLocks noGrp="1"/>
+          </p:cNvSpPr>
+          <p:nvPr>
+            <p:ph type="title"/>
+          </p:nvPr>
+        </p:nvSpPr>
+        <p:spPr>
+          <a:xfrm>
+            <a:off x="663633" y="243536"/>
+            <a:ext cx="11353800" cy="555233"/>
+          </a:xfrm>
+        </p:spPr>
+        <p:txBody>
+          <a:bodyPr>
+            <a:normAutofit fontScale="90000"/>
+          </a:bodyPr>
+          <a:lstStyle/>
+          <a:p>
+            <a:r>
+              <a:rPr lang="en-US" dirty="0"/>
+              <a:t>Calculating Bonus Plans for ~1,000 people world wide</a:t>
+            </a:r>
+          </a:p>
+        </p:txBody>
+      </p:sp>
+      <p:sp>
+        <p:nvSpPr>
+          <p:cNvPr id="4" name="Isosceles Triangle 3">
+            <a:extLst>
+              <a:ext uri="{FF2B5EF4-FFF2-40B4-BE49-F238E27FC236}">
+                <a16:creationId xmlns:a16="http://schemas.microsoft.com/office/drawing/2014/main" id="{B01F635F-E093-4CBE-91D9-47271D7CFF0C}"/>
+              </a:ext>
+            </a:extLst>
+          </p:cNvPr>
+          <p:cNvSpPr/>
+          <p:nvPr/>
+        </p:nvSpPr>
+        <p:spPr>
+          <a:xfrm rot="5400000">
+            <a:off x="2777144" y="-614154"/>
+            <a:ext cx="5486400" cy="8727658"/>
+          </a:xfrm>
+          <a:prstGeom prst="triangle">
+            <a:avLst>
+              <a:gd name="adj" fmla="val 49497"/>
+            </a:avLst>
+          </a:prstGeom>
+          <a:solidFill>
+            <a:schemeClr val="bg2"/>
+          </a:solidFill>
+          <a:ln>
+            <a:noFill/>
+          </a:ln>
+        </p:spPr>
+        <p:style>
+          <a:lnRef idx="2">
+            <a:schemeClr val="accent1">
+              <a:shade val="50000"/>
+            </a:schemeClr>
+          </a:lnRef>
+          <a:fillRef idx="1">
+            <a:schemeClr val="accent1"/>
+          </a:fillRef>
+          <a:effectRef idx="0">
+            <a:schemeClr val="accent1"/>
+          </a:effectRef>
+          <a:fontRef idx="minor">
+            <a:schemeClr val="lt1"/>
+          </a:fontRef>
+        </p:style>
+        <p:txBody>
+          <a:bodyPr rtlCol="0" anchor="ctr"/>
+          <a:lstStyle/>
+          <a:p>
+            <a:pPr algn="ctr"/>
+            <a:endParaRPr lang="en-US">
+              <a:latin typeface="+mj-lt"/>
+            </a:endParaRPr>
+          </a:p>
+        </p:txBody>
+      </p:sp>
+      <p:sp>
+        <p:nvSpPr>
+          <p:cNvPr id="5" name="TextBox 4">
+            <a:extLst>
+              <a:ext uri="{FF2B5EF4-FFF2-40B4-BE49-F238E27FC236}">
+                <a16:creationId xmlns:a16="http://schemas.microsoft.com/office/drawing/2014/main" id="{F0F46B08-5A02-461F-900C-8554A11FDD92}"/>
               </a:ext>
             </a:extLst>
           </p:cNvPr>
@@ -4483,8 +6230,8 @@
         </p:nvSpPr>
         <p:spPr>
           <a:xfrm>
-            <a:off x="2333747" y="2940536"/>
-            <a:ext cx="1633012" cy="461665"/>
+            <a:off x="2375120" y="2009291"/>
+            <a:ext cx="1633012" cy="276999"/>
           </a:xfrm>
           <a:prstGeom prst="rect">
             <a:avLst/>
@@ -4505,7 +6252,7 @@
                   </a:schemeClr>
                 </a:solidFill>
               </a:rPr>
-              <a:t>Employees information</a:t>
+              <a:t>Data Warehouse</a:t>
             </a:r>
             <a:endParaRPr lang="pl-PL" sz="1200" b="1" dirty="0">
               <a:solidFill>
@@ -4517,12 +6264,60 @@
           </a:p>
         </p:txBody>
       </p:sp>
+      <p:sp>
+        <p:nvSpPr>
+          <p:cNvPr id="6" name="TextBox 5">
+            <a:extLst>
+              <a:ext uri="{FF2B5EF4-FFF2-40B4-BE49-F238E27FC236}">
+                <a16:creationId xmlns:a16="http://schemas.microsoft.com/office/drawing/2014/main" id="{EEA8D49B-085A-4B7D-83DF-EEF72AB30FCC}"/>
+              </a:ext>
+            </a:extLst>
+          </p:cNvPr>
+          <p:cNvSpPr txBox="1"/>
+          <p:nvPr/>
+        </p:nvSpPr>
+        <p:spPr>
+          <a:xfrm>
+            <a:off x="2333747" y="5194881"/>
+            <a:ext cx="1633012" cy="461665"/>
+          </a:xfrm>
+          <a:prstGeom prst="rect">
+            <a:avLst/>
+          </a:prstGeom>
+          <a:noFill/>
+        </p:spPr>
+        <p:txBody>
+          <a:bodyPr wrap="square" rtlCol="0">
+            <a:spAutoFit/>
+          </a:bodyPr>
+          <a:lstStyle/>
+          <a:p>
+            <a:r>
+              <a:rPr lang="en-US" sz="1200" b="1" dirty="0">
+                <a:solidFill>
+                  <a:schemeClr val="tx2">
+                    <a:lumMod val="75000"/>
+                  </a:schemeClr>
+                </a:solidFill>
+              </a:rPr>
+              <a:t>Salesforce pipeline and conversion</a:t>
+            </a:r>
+            <a:endParaRPr lang="pl-PL" sz="1200" b="1" dirty="0">
+              <a:solidFill>
+                <a:schemeClr val="tx2">
+                  <a:lumMod val="75000"/>
+                </a:schemeClr>
+              </a:solidFill>
+            </a:endParaRPr>
+          </a:p>
+        </p:txBody>
+      </p:sp>
       <p:pic>
         <p:nvPicPr>
-          <p:cNvPr id="11" name="Picture 6" descr="Microsoft Excel | Logopedia | FANDOM powered by Wikia">
-            <a:extLst>
-              <a:ext uri="{FF2B5EF4-FFF2-40B4-BE49-F238E27FC236}">
-                <a16:creationId xmlns:a16="http://schemas.microsoft.com/office/drawing/2014/main" id="{A5DE715D-4851-49B7-875D-DE11B5B0FB2B}"/>
+          <p:cNvPr id="7" name="Picture 2" descr="Salesforce.com">
+            <a:extLst>
+              <a:ext uri="{FF2B5EF4-FFF2-40B4-BE49-F238E27FC236}">
+                <a16:creationId xmlns:a16="http://schemas.microsoft.com/office/drawing/2014/main" id="{F2C775C7-AD22-4564-B6A1-50AF5CDD090E}"/>
               </a:ext>
             </a:extLst>
           </p:cNvPr>
@@ -4531,23 +6326,21 @@
           </p:cNvPicPr>
           <p:nvPr/>
         </p:nvPicPr>
-        <p:blipFill>
-          <a:blip r:embed="rId5">
+        <p:blipFill rotWithShape="1">
+          <a:blip r:embed="rId2">
             <a:extLst>
               <a:ext uri="{28A0092B-C50C-407E-A947-70E740481C1C}">
                 <a14:useLocalDpi xmlns:a14="http://schemas.microsoft.com/office/drawing/2010/main" val="0"/>
               </a:ext>
             </a:extLst>
           </a:blip>
-          <a:srcRect/>
-          <a:stretch>
-            <a:fillRect/>
-          </a:stretch>
+          <a:srcRect r="47843"/>
+          <a:stretch/>
         </p:blipFill>
         <p:spPr bwMode="auto">
           <a:xfrm>
-            <a:off x="1570739" y="3970021"/>
-            <a:ext cx="618833" cy="648354"/>
+            <a:off x="1460225" y="5118932"/>
+            <a:ext cx="829800" cy="619125"/>
           </a:xfrm>
           <a:prstGeom prst="rect">
             <a:avLst/>
@@ -4564,6 +6357,130 @@
           </a:extLst>
         </p:spPr>
       </p:pic>
+      <p:pic>
+        <p:nvPicPr>
+          <p:cNvPr id="9" name="Picture 8">
+            <a:extLst>
+              <a:ext uri="{FF2B5EF4-FFF2-40B4-BE49-F238E27FC236}">
+                <a16:creationId xmlns:a16="http://schemas.microsoft.com/office/drawing/2014/main" id="{A72A8695-F136-48DF-8040-FF95278BB83C}"/>
+              </a:ext>
+            </a:extLst>
+          </p:cNvPr>
+          <p:cNvPicPr>
+            <a:picLocks noChangeAspect="1"/>
+          </p:cNvPicPr>
+          <p:nvPr/>
+        </p:nvPicPr>
+        <p:blipFill rotWithShape="1">
+          <a:blip r:embed="rId3"/>
+          <a:srcRect l="5788"/>
+          <a:stretch/>
+        </p:blipFill>
+        <p:spPr>
+          <a:xfrm>
+            <a:off x="1567378" y="2966582"/>
+            <a:ext cx="625249" cy="409575"/>
+          </a:xfrm>
+          <a:prstGeom prst="rect">
+            <a:avLst/>
+          </a:prstGeom>
+        </p:spPr>
+      </p:pic>
+      <p:sp>
+        <p:nvSpPr>
+          <p:cNvPr id="10" name="TextBox 9">
+            <a:extLst>
+              <a:ext uri="{FF2B5EF4-FFF2-40B4-BE49-F238E27FC236}">
+                <a16:creationId xmlns:a16="http://schemas.microsoft.com/office/drawing/2014/main" id="{242F4D00-0A1D-4586-BDEF-B3331E282666}"/>
+              </a:ext>
+            </a:extLst>
+          </p:cNvPr>
+          <p:cNvSpPr txBox="1"/>
+          <p:nvPr/>
+        </p:nvSpPr>
+        <p:spPr>
+          <a:xfrm>
+            <a:off x="2333747" y="2940536"/>
+            <a:ext cx="1633012" cy="461665"/>
+          </a:xfrm>
+          <a:prstGeom prst="rect">
+            <a:avLst/>
+          </a:prstGeom>
+          <a:noFill/>
+        </p:spPr>
+        <p:txBody>
+          <a:bodyPr wrap="square" rtlCol="0">
+            <a:spAutoFit/>
+          </a:bodyPr>
+          <a:lstStyle/>
+          <a:p>
+            <a:r>
+              <a:rPr lang="en-US" sz="1200" b="1" dirty="0">
+                <a:solidFill>
+                  <a:schemeClr val="tx2">
+                    <a:lumMod val="75000"/>
+                  </a:schemeClr>
+                </a:solidFill>
+              </a:rPr>
+              <a:t>Employees information</a:t>
+            </a:r>
+            <a:endParaRPr lang="pl-PL" sz="1200" b="1" dirty="0">
+              <a:solidFill>
+                <a:schemeClr val="tx2">
+                  <a:lumMod val="75000"/>
+                </a:schemeClr>
+              </a:solidFill>
+            </a:endParaRPr>
+          </a:p>
+        </p:txBody>
+      </p:sp>
+      <p:pic>
+        <p:nvPicPr>
+          <p:cNvPr id="11" name="Picture 6" descr="Microsoft Excel | Logopedia | FANDOM powered by Wikia">
+            <a:extLst>
+              <a:ext uri="{FF2B5EF4-FFF2-40B4-BE49-F238E27FC236}">
+                <a16:creationId xmlns:a16="http://schemas.microsoft.com/office/drawing/2014/main" id="{A5DE715D-4851-49B7-875D-DE11B5B0FB2B}"/>
+              </a:ext>
+            </a:extLst>
+          </p:cNvPr>
+          <p:cNvPicPr>
+            <a:picLocks noChangeAspect="1" noChangeArrowheads="1"/>
+          </p:cNvPicPr>
+          <p:nvPr/>
+        </p:nvPicPr>
+        <p:blipFill>
+          <a:blip r:embed="rId4">
+            <a:extLst>
+              <a:ext uri="{28A0092B-C50C-407E-A947-70E740481C1C}">
+                <a14:useLocalDpi xmlns:a14="http://schemas.microsoft.com/office/drawing/2010/main" val="0"/>
+              </a:ext>
+            </a:extLst>
+          </a:blip>
+          <a:srcRect/>
+          <a:stretch>
+            <a:fillRect/>
+          </a:stretch>
+        </p:blipFill>
+        <p:spPr bwMode="auto">
+          <a:xfrm>
+            <a:off x="1570739" y="3970021"/>
+            <a:ext cx="618833" cy="648354"/>
+          </a:xfrm>
+          <a:prstGeom prst="rect">
+            <a:avLst/>
+          </a:prstGeom>
+          <a:noFill/>
+          <a:extLst>
+            <a:ext uri="{909E8E84-426E-40DD-AFC4-6F175D3DCCD1}">
+              <a14:hiddenFill xmlns:a14="http://schemas.microsoft.com/office/drawing/2010/main">
+                <a:solidFill>
+                  <a:srgbClr val="FFFFFF"/>
+                </a:solidFill>
+              </a14:hiddenFill>
+            </a:ext>
+          </a:extLst>
+        </p:spPr>
+      </p:pic>
       <p:sp>
         <p:nvSpPr>
           <p:cNvPr id="12" name="TextBox 11">
@@ -4630,8 +6547,8 @@
         </p:nvCxnSpPr>
         <p:spPr>
           <a:xfrm>
-            <a:off x="3191626" y="2470956"/>
-            <a:ext cx="2139951" cy="1233553"/>
+            <a:off x="3191626" y="2286290"/>
+            <a:ext cx="2139951" cy="1418219"/>
           </a:xfrm>
           <a:prstGeom prst="straightConnector1">
             <a:avLst/>
@@ -5376,7 +7293,7 @@
           <p:nvPr/>
         </p:nvPicPr>
         <p:blipFill>
-          <a:blip r:embed="rId5">
+          <a:blip r:embed="rId4">
             <a:extLst>
               <a:ext uri="{28A0092B-C50C-407E-A947-70E740481C1C}">
                 <a14:useLocalDpi xmlns:a14="http://schemas.microsoft.com/office/drawing/2010/main" val="0"/>
@@ -5392,6 +7309,53 @@
           <a:xfrm>
             <a:off x="5331577" y="3380332"/>
             <a:ext cx="618833" cy="648354"/>
+          </a:xfrm>
+          <a:prstGeom prst="rect">
+            <a:avLst/>
+          </a:prstGeom>
+          <a:noFill/>
+          <a:extLst>
+            <a:ext uri="{909E8E84-426E-40DD-AFC4-6F175D3DCCD1}">
+              <a14:hiddenFill xmlns:a14="http://schemas.microsoft.com/office/drawing/2010/main">
+                <a:solidFill>
+                  <a:srgbClr val="FFFFFF"/>
+                </a:solidFill>
+              </a14:hiddenFill>
+            </a:ext>
+          </a:extLst>
+        </p:spPr>
+      </p:pic>
+      <p:pic>
+        <p:nvPicPr>
+          <p:cNvPr id="27" name="Picture 2" descr="https://3.bp.blogspot.com/--ZLG6S40Qug/VvAZLPA9ftI/AAAAAAAABdU/Z_B2JNrZH1w1NS8yDKiiMWsBdVcDGkyjQ/s1600/dwh3.jpg">
+            <a:extLst>
+              <a:ext uri="{FF2B5EF4-FFF2-40B4-BE49-F238E27FC236}">
+                <a16:creationId xmlns:a16="http://schemas.microsoft.com/office/drawing/2014/main" id="{083F46FA-4166-46B2-AE44-3B98E3787363}"/>
+              </a:ext>
+            </a:extLst>
+          </p:cNvPr>
+          <p:cNvPicPr>
+            <a:picLocks noChangeAspect="1" noChangeArrowheads="1"/>
+          </p:cNvPicPr>
+          <p:nvPr/>
+        </p:nvPicPr>
+        <p:blipFill>
+          <a:blip r:embed="rId5">
+            <a:extLst>
+              <a:ext uri="{28A0092B-C50C-407E-A947-70E740481C1C}">
+                <a14:useLocalDpi xmlns:a14="http://schemas.microsoft.com/office/drawing/2010/main" val="0"/>
+              </a:ext>
+            </a:extLst>
+          </a:blip>
+          <a:srcRect/>
+          <a:stretch>
+            <a:fillRect/>
+          </a:stretch>
+        </p:blipFill>
+        <p:spPr bwMode="auto">
+          <a:xfrm>
+            <a:off x="1160324" y="1934375"/>
+            <a:ext cx="1236197" cy="648355"/>
           </a:xfrm>
           <a:prstGeom prst="rect">
             <a:avLst/>
@@ -5421,7 +7385,7 @@
 </p:sld>
 </file>
 
-<file path=ppt/slides/slide6.xml><?xml version="1.0" encoding="utf-8"?>
+<file path=ppt/slides/slide8.xml><?xml version="1.0" encoding="utf-8"?>
 <p:sld xmlns:a="http://schemas.openxmlformats.org/drawingml/2006/main" xmlns:r="http://schemas.openxmlformats.org/officeDocument/2006/relationships" xmlns:p="http://schemas.openxmlformats.org/presentationml/2006/main">
   <p:cSld>
     <p:spTree>
@@ -5544,7 +7508,7 @@
         <p:spPr>
           <a:xfrm>
             <a:off x="2492084" y="2009291"/>
-            <a:ext cx="1710913" cy="461665"/>
+            <a:ext cx="1710913" cy="276999"/>
           </a:xfrm>
           <a:prstGeom prst="rect">
             <a:avLst/>
@@ -5565,26 +7529,7 @@
                   </a:schemeClr>
                 </a:solidFill>
               </a:rPr>
-              <a:t>TED Indirect Sales</a:t>
-            </a:r>
-            <a:endParaRPr lang="pl-PL" sz="1200" b="1" dirty="0">
-              <a:solidFill>
-                <a:schemeClr val="tx2">
-                  <a:lumMod val="75000"/>
-                </a:schemeClr>
-              </a:solidFill>
-            </a:endParaRPr>
-          </a:p>
-          <a:p>
-            <a:r>
-              <a:rPr lang="en-US" sz="1200" b="1" dirty="0">
-                <a:solidFill>
-                  <a:schemeClr val="tx2">
-                    <a:lumMod val="75000"/>
-                  </a:schemeClr>
-                </a:solidFill>
-              </a:rPr>
-              <a:t>TED Direct Sales</a:t>
+              <a:t>Data Warehouse</a:t>
             </a:r>
             <a:endParaRPr lang="pl-PL" sz="1200" b="1" dirty="0">
               <a:solidFill>
@@ -5691,10 +7636,10 @@
       </p:pic>
       <p:pic>
         <p:nvPicPr>
-          <p:cNvPr id="31" name="Picture 30">
-            <a:extLst>
-              <a:ext uri="{FF2B5EF4-FFF2-40B4-BE49-F238E27FC236}">
-                <a16:creationId xmlns:a16="http://schemas.microsoft.com/office/drawing/2014/main" id="{45DB158C-6A60-437A-AFF2-BE0495005BD6}"/>
+          <p:cNvPr id="32" name="Picture 31">
+            <a:extLst>
+              <a:ext uri="{FF2B5EF4-FFF2-40B4-BE49-F238E27FC236}">
+                <a16:creationId xmlns:a16="http://schemas.microsoft.com/office/drawing/2014/main" id="{0E1DC388-8E59-4FB8-9A6F-3874C85BB54F}"/>
               </a:ext>
             </a:extLst>
           </p:cNvPr>
@@ -5703,38 +7648,8 @@
           </p:cNvPicPr>
           <p:nvPr/>
         </p:nvPicPr>
-        <p:blipFill>
+        <p:blipFill rotWithShape="1">
           <a:blip r:embed="rId3"/>
-          <a:stretch>
-            <a:fillRect/>
-          </a:stretch>
-        </p:blipFill>
-        <p:spPr>
-          <a:xfrm>
-            <a:off x="1368134" y="2006806"/>
-            <a:ext cx="1123950" cy="390525"/>
-          </a:xfrm>
-          <a:prstGeom prst="rect">
-            <a:avLst/>
-          </a:prstGeom>
-        </p:spPr>
-      </p:pic>
-      <p:pic>
-        <p:nvPicPr>
-          <p:cNvPr id="32" name="Picture 31">
-            <a:extLst>
-              <a:ext uri="{FF2B5EF4-FFF2-40B4-BE49-F238E27FC236}">
-                <a16:creationId xmlns:a16="http://schemas.microsoft.com/office/drawing/2014/main" id="{0E1DC388-8E59-4FB8-9A6F-3874C85BB54F}"/>
-              </a:ext>
-            </a:extLst>
-          </p:cNvPr>
-          <p:cNvPicPr>
-            <a:picLocks noChangeAspect="1"/>
-          </p:cNvPicPr>
-          <p:nvPr/>
-        </p:nvPicPr>
-        <p:blipFill rotWithShape="1">
-          <a:blip r:embed="rId4"/>
           <a:srcRect l="5788"/>
           <a:stretch/>
         </p:blipFill>
@@ -5811,7 +7726,7 @@
           <p:nvPr/>
         </p:nvPicPr>
         <p:blipFill>
-          <a:blip r:embed="rId5">
+          <a:blip r:embed="rId4">
             <a:extLst>
               <a:ext uri="{28A0092B-C50C-407E-A947-70E740481C1C}">
                 <a14:useLocalDpi xmlns:a14="http://schemas.microsoft.com/office/drawing/2010/main" val="0"/>
@@ -5909,8 +7824,8 @@
         </p:nvCxnSpPr>
         <p:spPr>
           <a:xfrm>
-            <a:off x="3347541" y="2470956"/>
-            <a:ext cx="2101001" cy="1233553"/>
+            <a:off x="3347541" y="2286290"/>
+            <a:ext cx="2101001" cy="1418219"/>
           </a:xfrm>
           <a:prstGeom prst="straightConnector1">
             <a:avLst/>
@@ -6553,7 +8468,7 @@
           <p:nvPr/>
         </p:nvPicPr>
         <p:blipFill>
-          <a:blip r:embed="rId5">
+          <a:blip r:embed="rId4">
             <a:extLst>
               <a:ext uri="{28A0092B-C50C-407E-A947-70E740481C1C}">
                 <a14:useLocalDpi xmlns:a14="http://schemas.microsoft.com/office/drawing/2010/main" val="0"/>
@@ -6732,13 +8647,13 @@
           <p:nvPr/>
         </p:nvPicPr>
         <p:blipFill>
-          <a:blip r:embed="rId6">
+          <a:blip r:embed="rId5">
             <a:extLst>
               <a:ext uri="{28A0092B-C50C-407E-A947-70E740481C1C}">
                 <a14:useLocalDpi xmlns:a14="http://schemas.microsoft.com/office/drawing/2010/main" val="0"/>
               </a:ext>
               <a:ext uri="{96DAC541-7B7A-43D3-8B79-37D633B846F1}">
-                <asvg:svgBlip xmlns:asvg="http://schemas.microsoft.com/office/drawing/2016/SVG/main" r:embed="rId7"/>
+                <asvg:svgBlip xmlns:asvg="http://schemas.microsoft.com/office/drawing/2016/SVG/main" r:embed="rId6"/>
               </a:ext>
             </a:extLst>
           </a:blip>
@@ -8124,7 +10039,7 @@
           <p:nvPr/>
         </p:nvPicPr>
         <p:blipFill>
-          <a:blip r:embed="rId8"/>
+          <a:blip r:embed="rId7"/>
           <a:stretch>
             <a:fillRect/>
           </a:stretch>
@@ -8193,6 +10108,53 @@
           </a:p>
         </p:txBody>
       </p:sp>
+      <p:pic>
+        <p:nvPicPr>
+          <p:cNvPr id="75" name="Picture 2" descr="https://3.bp.blogspot.com/--ZLG6S40Qug/VvAZLPA9ftI/AAAAAAAABdU/Z_B2JNrZH1w1NS8yDKiiMWsBdVcDGkyjQ/s1600/dwh3.jpg">
+            <a:extLst>
+              <a:ext uri="{FF2B5EF4-FFF2-40B4-BE49-F238E27FC236}">
+                <a16:creationId xmlns:a16="http://schemas.microsoft.com/office/drawing/2014/main" id="{D05213A2-02A0-497E-A148-036D3580C10F}"/>
+              </a:ext>
+            </a:extLst>
+          </p:cNvPr>
+          <p:cNvPicPr>
+            <a:picLocks noChangeAspect="1" noChangeArrowheads="1"/>
+          </p:cNvPicPr>
+          <p:nvPr/>
+        </p:nvPicPr>
+        <p:blipFill>
+          <a:blip r:embed="rId8">
+            <a:extLst>
+              <a:ext uri="{28A0092B-C50C-407E-A947-70E740481C1C}">
+                <a14:useLocalDpi xmlns:a14="http://schemas.microsoft.com/office/drawing/2010/main" val="0"/>
+              </a:ext>
+            </a:extLst>
+          </a:blip>
+          <a:srcRect/>
+          <a:stretch>
+            <a:fillRect/>
+          </a:stretch>
+        </p:blipFill>
+        <p:spPr bwMode="auto">
+          <a:xfrm>
+            <a:off x="1160324" y="1934375"/>
+            <a:ext cx="1236197" cy="648355"/>
+          </a:xfrm>
+          <a:prstGeom prst="rect">
+            <a:avLst/>
+          </a:prstGeom>
+          <a:noFill/>
+          <a:extLst>
+            <a:ext uri="{909E8E84-426E-40DD-AFC4-6F175D3DCCD1}">
+              <a14:hiddenFill xmlns:a14="http://schemas.microsoft.com/office/drawing/2010/main">
+                <a:solidFill>
+                  <a:srgbClr val="FFFFFF"/>
+                </a:solidFill>
+              </a14:hiddenFill>
+            </a:ext>
+          </a:extLst>
+        </p:spPr>
+      </p:pic>
     </p:spTree>
     <p:extLst>
       <p:ext uri="{BB962C8B-B14F-4D97-AF65-F5344CB8AC3E}">
@@ -8206,7 +10168,7 @@
 </p:sld>
 </file>
 
-<file path=ppt/slides/slide7.xml><?xml version="1.0" encoding="utf-8"?>
+<file path=ppt/slides/slide9.xml><?xml version="1.0" encoding="utf-8"?>
 <p:sld xmlns:a="http://schemas.openxmlformats.org/drawingml/2006/main" xmlns:r="http://schemas.openxmlformats.org/officeDocument/2006/relationships" xmlns:p="http://schemas.openxmlformats.org/presentationml/2006/main">
   <p:cSld>
     <p:spTree>
@@ -8329,7 +10291,7 @@
         <p:spPr>
           <a:xfrm>
             <a:off x="2415800" y="2007560"/>
-            <a:ext cx="1710913" cy="461665"/>
+            <a:ext cx="1710913" cy="276999"/>
           </a:xfrm>
           <a:prstGeom prst="rect">
             <a:avLst/>
@@ -8350,26 +10312,7 @@
                   </a:schemeClr>
                 </a:solidFill>
               </a:rPr>
-              <a:t>TED Indirect Sales</a:t>
-            </a:r>
-            <a:endParaRPr lang="pl-PL" sz="1200" b="1" dirty="0">
-              <a:solidFill>
-                <a:schemeClr val="tx2">
-                  <a:lumMod val="75000"/>
-                </a:schemeClr>
-              </a:solidFill>
-            </a:endParaRPr>
-          </a:p>
-          <a:p>
-            <a:r>
-              <a:rPr lang="en-US" sz="1200" b="1" dirty="0">
-                <a:solidFill>
-                  <a:schemeClr val="tx2">
-                    <a:lumMod val="75000"/>
-                  </a:schemeClr>
-                </a:solidFill>
-              </a:rPr>
-              <a:t>TED Direct Sales</a:t>
+              <a:t>Data Warehouse</a:t>
             </a:r>
             <a:endParaRPr lang="pl-PL" sz="1200" b="1" dirty="0">
               <a:solidFill>
@@ -8476,10 +10419,10 @@
       </p:pic>
       <p:pic>
         <p:nvPicPr>
-          <p:cNvPr id="80" name="Picture 79">
-            <a:extLst>
-              <a:ext uri="{FF2B5EF4-FFF2-40B4-BE49-F238E27FC236}">
-                <a16:creationId xmlns:a16="http://schemas.microsoft.com/office/drawing/2014/main" id="{95157FEA-DD51-4776-9B21-A607EC754899}"/>
+          <p:cNvPr id="81" name="Picture 80">
+            <a:extLst>
+              <a:ext uri="{FF2B5EF4-FFF2-40B4-BE49-F238E27FC236}">
+                <a16:creationId xmlns:a16="http://schemas.microsoft.com/office/drawing/2014/main" id="{3FF03650-D9B2-47FC-BB1C-421F66D1F810}"/>
               </a:ext>
             </a:extLst>
           </p:cNvPr>
@@ -8488,38 +10431,8 @@
           </p:cNvPicPr>
           <p:nvPr/>
         </p:nvPicPr>
-        <p:blipFill>
+        <p:blipFill rotWithShape="1">
           <a:blip r:embed="rId3"/>
-          <a:stretch>
-            <a:fillRect/>
-          </a:stretch>
-        </p:blipFill>
-        <p:spPr>
-          <a:xfrm>
-            <a:off x="1291850" y="2005075"/>
-            <a:ext cx="1123950" cy="390525"/>
-          </a:xfrm>
-          <a:prstGeom prst="rect">
-            <a:avLst/>
-          </a:prstGeom>
-        </p:spPr>
-      </p:pic>
-      <p:pic>
-        <p:nvPicPr>
-          <p:cNvPr id="81" name="Picture 80">
-            <a:extLst>
-              <a:ext uri="{FF2B5EF4-FFF2-40B4-BE49-F238E27FC236}">
-                <a16:creationId xmlns:a16="http://schemas.microsoft.com/office/drawing/2014/main" id="{3FF03650-D9B2-47FC-BB1C-421F66D1F810}"/>
-              </a:ext>
-            </a:extLst>
-          </p:cNvPr>
-          <p:cNvPicPr>
-            <a:picLocks noChangeAspect="1"/>
-          </p:cNvPicPr>
-          <p:nvPr/>
-        </p:nvPicPr>
-        <p:blipFill rotWithShape="1">
-          <a:blip r:embed="rId4"/>
           <a:srcRect l="5788"/>
           <a:stretch/>
         </p:blipFill>
@@ -8596,7 +10509,7 @@
           <p:nvPr/>
         </p:nvPicPr>
         <p:blipFill>
-          <a:blip r:embed="rId5">
+          <a:blip r:embed="rId4">
             <a:extLst>
               <a:ext uri="{28A0092B-C50C-407E-A947-70E740481C1C}">
                 <a14:useLocalDpi xmlns:a14="http://schemas.microsoft.com/office/drawing/2010/main" val="0"/>
@@ -8693,8 +10606,8 @@
         </p:nvCxnSpPr>
         <p:spPr>
           <a:xfrm>
-            <a:off x="3271257" y="2469225"/>
-            <a:ext cx="1836465" cy="1275049"/>
+            <a:off x="3271257" y="2284559"/>
+            <a:ext cx="1836465" cy="1459715"/>
           </a:xfrm>
           <a:prstGeom prst="straightConnector1">
             <a:avLst/>
@@ -9049,7 +10962,7 @@
           <p:nvPr/>
         </p:nvPicPr>
         <p:blipFill>
-          <a:blip r:embed="rId6"/>
+          <a:blip r:embed="rId5"/>
           <a:stretch>
             <a:fillRect/>
           </a:stretch>
@@ -9523,7 +11436,7 @@
               <p:nvPr/>
             </p:nvPicPr>
             <p:blipFill>
-              <a:blip r:embed="rId7"/>
+              <a:blip r:embed="rId6"/>
               <a:stretch>
                 <a:fillRect/>
               </a:stretch>
@@ -10027,7 +11940,7 @@
             <p:nvPr/>
           </p:nvPicPr>
           <p:blipFill>
-            <a:blip r:embed="rId8"/>
+            <a:blip r:embed="rId7"/>
             <a:stretch>
               <a:fillRect/>
             </a:stretch>
@@ -10461,77 +12374,12 @@
           </a:p>
         </p:txBody>
       </p:sp>
-    </p:spTree>
-    <p:extLst>
-      <p:ext uri="{BB962C8B-B14F-4D97-AF65-F5344CB8AC3E}">
-        <p14:creationId xmlns:p14="http://schemas.microsoft.com/office/powerpoint/2010/main" val="1185773748"/>
-      </p:ext>
-    </p:extLst>
-  </p:cSld>
-  <p:clrMapOvr>
-    <a:masterClrMapping/>
-  </p:clrMapOvr>
-</p:sld>
-</file>
-
-<file path=ppt/slides/slide8.xml><?xml version="1.0" encoding="utf-8"?>
-<p:sld xmlns:a="http://schemas.openxmlformats.org/drawingml/2006/main" xmlns:r="http://schemas.openxmlformats.org/officeDocument/2006/relationships" xmlns:p="http://schemas.openxmlformats.org/presentationml/2006/main">
-  <p:cSld>
-    <p:spTree>
-      <p:nvGrpSpPr>
-        <p:cNvPr id="1" name=""/>
-        <p:cNvGrpSpPr/>
-        <p:nvPr/>
-      </p:nvGrpSpPr>
-      <p:grpSpPr>
-        <a:xfrm>
-          <a:off x="0" y="0"/>
-          <a:ext cx="0" cy="0"/>
-          <a:chOff x="0" y="0"/>
-          <a:chExt cx="0" cy="0"/>
-        </a:xfrm>
-      </p:grpSpPr>
-      <p:sp>
-        <p:nvSpPr>
-          <p:cNvPr id="2" name="Title 1">
-            <a:extLst>
-              <a:ext uri="{FF2B5EF4-FFF2-40B4-BE49-F238E27FC236}">
-                <a16:creationId xmlns:a16="http://schemas.microsoft.com/office/drawing/2014/main" id="{5068025D-663A-40F9-A40B-214B32CD77F1}"/>
-              </a:ext>
-            </a:extLst>
-          </p:cNvPr>
-          <p:cNvSpPr>
-            <a:spLocks noGrp="1"/>
-          </p:cNvSpPr>
-          <p:nvPr>
-            <p:ph type="title"/>
-          </p:nvPr>
-        </p:nvSpPr>
-        <p:spPr>
-          <a:xfrm>
-            <a:off x="663633" y="243536"/>
-            <a:ext cx="11353800" cy="555233"/>
-          </a:xfrm>
-        </p:spPr>
-        <p:txBody>
-          <a:bodyPr>
-            <a:normAutofit fontScale="90000"/>
-          </a:bodyPr>
-          <a:lstStyle/>
-          <a:p>
-            <a:r>
-              <a:rPr lang="en-US" dirty="0"/>
-              <a:t>The world is changing</a:t>
-            </a:r>
-          </a:p>
-        </p:txBody>
-      </p:sp>
       <p:pic>
         <p:nvPicPr>
-          <p:cNvPr id="3074" name="Picture 2" descr="https://external-content.duckduckgo.com/iu/?u=https%3A%2F%2Ftse1.mm.bing.net%2Fth%3Fid%3DOIP.rRikbd2Js4CYSI6VZeJQzwHaFj%26pid%3DApi&amp;f=1">
-            <a:extLst>
-              <a:ext uri="{FF2B5EF4-FFF2-40B4-BE49-F238E27FC236}">
-                <a16:creationId xmlns:a16="http://schemas.microsoft.com/office/drawing/2014/main" id="{EEAC4C7A-2B98-4F19-84D3-FAADD70BB258}"/>
+          <p:cNvPr id="48" name="Picture 2" descr="https://3.bp.blogspot.com/--ZLG6S40Qug/VvAZLPA9ftI/AAAAAAAABdU/Z_B2JNrZH1w1NS8yDKiiMWsBdVcDGkyjQ/s1600/dwh3.jpg">
+            <a:extLst>
+              <a:ext uri="{FF2B5EF4-FFF2-40B4-BE49-F238E27FC236}">
+                <a16:creationId xmlns:a16="http://schemas.microsoft.com/office/drawing/2014/main" id="{7BAF5DEE-9FFA-453E-B789-8FE818131714}"/>
               </a:ext>
             </a:extLst>
           </p:cNvPr>
@@ -10541,7 +12389,7 @@
           <p:nvPr/>
         </p:nvPicPr>
         <p:blipFill>
-          <a:blip r:embed="rId2">
+          <a:blip r:embed="rId8">
             <a:extLst>
               <a:ext uri="{28A0092B-C50C-407E-A947-70E740481C1C}">
                 <a14:useLocalDpi xmlns:a14="http://schemas.microsoft.com/office/drawing/2010/main" val="0"/>
@@ -10555,8 +12403,8 @@
         </p:blipFill>
         <p:spPr bwMode="auto">
           <a:xfrm>
-            <a:off x="4814703" y="1464250"/>
-            <a:ext cx="2542433" cy="1904143"/>
+            <a:off x="1160324" y="1934375"/>
+            <a:ext cx="1236197" cy="648355"/>
           </a:xfrm>
           <a:prstGeom prst="rect">
             <a:avLst/>
@@ -10573,396 +12421,10 @@
           </a:extLst>
         </p:spPr>
       </p:pic>
-      <p:pic>
-        <p:nvPicPr>
-          <p:cNvPr id="3076" name="Picture 4" descr="https://external-content.duckduckgo.com/iu/?u=https%3A%2F%2Fyourfirststep.org%2Fwp-content%2Fuploads%2F2016%2F09%2Fcar-map2.jpg&amp;f=1&amp;nofb=1">
-            <a:extLst>
-              <a:ext uri="{FF2B5EF4-FFF2-40B4-BE49-F238E27FC236}">
-                <a16:creationId xmlns:a16="http://schemas.microsoft.com/office/drawing/2014/main" id="{FDD5AD38-BB5E-4A82-ABF7-76B0F35FC075}"/>
-              </a:ext>
-            </a:extLst>
-          </p:cNvPr>
-          <p:cNvPicPr>
-            <a:picLocks noChangeAspect="1" noChangeArrowheads="1"/>
-          </p:cNvPicPr>
-          <p:nvPr/>
-        </p:nvPicPr>
-        <p:blipFill>
-          <a:blip r:embed="rId3">
-            <a:extLst>
-              <a:ext uri="{28A0092B-C50C-407E-A947-70E740481C1C}">
-                <a14:useLocalDpi xmlns:a14="http://schemas.microsoft.com/office/drawing/2010/main" val="0"/>
-              </a:ext>
-            </a:extLst>
-          </a:blip>
-          <a:srcRect/>
-          <a:stretch>
-            <a:fillRect/>
-          </a:stretch>
-        </p:blipFill>
-        <p:spPr bwMode="auto">
-          <a:xfrm>
-            <a:off x="848382" y="1464251"/>
-            <a:ext cx="2542433" cy="1904143"/>
-          </a:xfrm>
-          <a:prstGeom prst="rect">
-            <a:avLst/>
-          </a:prstGeom>
-          <a:noFill/>
-          <a:extLst>
-            <a:ext uri="{909E8E84-426E-40DD-AFC4-6F175D3DCCD1}">
-              <a14:hiddenFill xmlns:a14="http://schemas.microsoft.com/office/drawing/2010/main">
-                <a:solidFill>
-                  <a:srgbClr val="FFFFFF"/>
-                </a:solidFill>
-              </a14:hiddenFill>
-            </a:ext>
-          </a:extLst>
-        </p:spPr>
-      </p:pic>
-      <p:pic>
-        <p:nvPicPr>
-          <p:cNvPr id="3" name="Picture 2">
-            <a:extLst>
-              <a:ext uri="{FF2B5EF4-FFF2-40B4-BE49-F238E27FC236}">
-                <a16:creationId xmlns:a16="http://schemas.microsoft.com/office/drawing/2014/main" id="{91C551D1-200A-45D8-99AF-A25DFCC63891}"/>
-              </a:ext>
-            </a:extLst>
-          </p:cNvPr>
-          <p:cNvPicPr>
-            <a:picLocks noChangeAspect="1"/>
-          </p:cNvPicPr>
-          <p:nvPr/>
-        </p:nvPicPr>
-        <p:blipFill>
-          <a:blip r:embed="rId4"/>
-          <a:stretch>
-            <a:fillRect/>
-          </a:stretch>
-        </p:blipFill>
-        <p:spPr>
-          <a:xfrm>
-            <a:off x="8781027" y="1464251"/>
-            <a:ext cx="2747340" cy="1904143"/>
-          </a:xfrm>
-          <a:prstGeom prst="rect">
-            <a:avLst/>
-          </a:prstGeom>
-        </p:spPr>
-      </p:pic>
-      <p:sp>
-        <p:nvSpPr>
-          <p:cNvPr id="27" name="Arrow: Right 26">
-            <a:extLst>
-              <a:ext uri="{FF2B5EF4-FFF2-40B4-BE49-F238E27FC236}">
-                <a16:creationId xmlns:a16="http://schemas.microsoft.com/office/drawing/2014/main" id="{1AF8BA7B-C830-4A0C-ABC8-AE2473C81342}"/>
-              </a:ext>
-            </a:extLst>
-          </p:cNvPr>
-          <p:cNvSpPr/>
-          <p:nvPr/>
-        </p:nvSpPr>
-        <p:spPr>
-          <a:xfrm>
-            <a:off x="3749120" y="1979837"/>
-            <a:ext cx="762000" cy="863600"/>
-          </a:xfrm>
-          <a:prstGeom prst="rightArrow">
-            <a:avLst/>
-          </a:prstGeom>
-          <a:solidFill>
-            <a:schemeClr val="bg2">
-              <a:lumMod val="25000"/>
-            </a:schemeClr>
-          </a:solidFill>
-          <a:ln>
-            <a:noFill/>
-          </a:ln>
-        </p:spPr>
-        <p:style>
-          <a:lnRef idx="2">
-            <a:schemeClr val="accent1">
-              <a:shade val="50000"/>
-            </a:schemeClr>
-          </a:lnRef>
-          <a:fillRef idx="1">
-            <a:schemeClr val="accent1"/>
-          </a:fillRef>
-          <a:effectRef idx="0">
-            <a:schemeClr val="accent1"/>
-          </a:effectRef>
-          <a:fontRef idx="minor">
-            <a:schemeClr val="lt1"/>
-          </a:fontRef>
-        </p:style>
-        <p:txBody>
-          <a:bodyPr rtlCol="0" anchor="ctr"/>
-          <a:lstStyle/>
-          <a:p>
-            <a:pPr algn="ctr"/>
-            <a:endParaRPr lang="en-US" dirty="0"/>
-          </a:p>
-        </p:txBody>
-      </p:sp>
-      <p:sp>
-        <p:nvSpPr>
-          <p:cNvPr id="31" name="Arrow: Right 30">
-            <a:extLst>
-              <a:ext uri="{FF2B5EF4-FFF2-40B4-BE49-F238E27FC236}">
-                <a16:creationId xmlns:a16="http://schemas.microsoft.com/office/drawing/2014/main" id="{7D65AEFA-DFB5-4CAC-9E57-C9CD36B40AA8}"/>
-              </a:ext>
-            </a:extLst>
-          </p:cNvPr>
-          <p:cNvSpPr/>
-          <p:nvPr/>
-        </p:nvSpPr>
-        <p:spPr>
-          <a:xfrm>
-            <a:off x="7688081" y="1979837"/>
-            <a:ext cx="762000" cy="863600"/>
-          </a:xfrm>
-          <a:prstGeom prst="rightArrow">
-            <a:avLst/>
-          </a:prstGeom>
-          <a:solidFill>
-            <a:schemeClr val="bg2">
-              <a:lumMod val="25000"/>
-            </a:schemeClr>
-          </a:solidFill>
-          <a:ln>
-            <a:noFill/>
-          </a:ln>
-        </p:spPr>
-        <p:style>
-          <a:lnRef idx="2">
-            <a:schemeClr val="accent1">
-              <a:shade val="50000"/>
-            </a:schemeClr>
-          </a:lnRef>
-          <a:fillRef idx="1">
-            <a:schemeClr val="accent1"/>
-          </a:fillRef>
-          <a:effectRef idx="0">
-            <a:schemeClr val="accent1"/>
-          </a:effectRef>
-          <a:fontRef idx="minor">
-            <a:schemeClr val="lt1"/>
-          </a:fontRef>
-        </p:style>
-        <p:txBody>
-          <a:bodyPr rtlCol="0" anchor="ctr"/>
-          <a:lstStyle/>
-          <a:p>
-            <a:pPr algn="ctr"/>
-            <a:endParaRPr lang="en-US" dirty="0"/>
-          </a:p>
-        </p:txBody>
-      </p:sp>
-      <p:sp>
-        <p:nvSpPr>
-          <p:cNvPr id="33" name="Arrow: Right 32">
-            <a:extLst>
-              <a:ext uri="{FF2B5EF4-FFF2-40B4-BE49-F238E27FC236}">
-                <a16:creationId xmlns:a16="http://schemas.microsoft.com/office/drawing/2014/main" id="{7CC84945-CA9F-4CD4-93CF-099294F6D315}"/>
-              </a:ext>
-            </a:extLst>
-          </p:cNvPr>
-          <p:cNvSpPr/>
-          <p:nvPr/>
-        </p:nvSpPr>
-        <p:spPr>
-          <a:xfrm>
-            <a:off x="848382" y="798769"/>
-            <a:ext cx="10679985" cy="665481"/>
-          </a:xfrm>
-          <a:prstGeom prst="rightArrow">
-            <a:avLst/>
-          </a:prstGeom>
-          <a:solidFill>
-            <a:schemeClr val="bg2">
-              <a:lumMod val="25000"/>
-            </a:schemeClr>
-          </a:solidFill>
-          <a:ln>
-            <a:noFill/>
-          </a:ln>
-        </p:spPr>
-        <p:style>
-          <a:lnRef idx="2">
-            <a:schemeClr val="accent1">
-              <a:shade val="50000"/>
-            </a:schemeClr>
-          </a:lnRef>
-          <a:fillRef idx="1">
-            <a:schemeClr val="accent1"/>
-          </a:fillRef>
-          <a:effectRef idx="0">
-            <a:schemeClr val="accent1"/>
-          </a:effectRef>
-          <a:fontRef idx="minor">
-            <a:schemeClr val="lt1"/>
-          </a:fontRef>
-        </p:style>
-        <p:txBody>
-          <a:bodyPr rtlCol="0" anchor="ctr"/>
-          <a:lstStyle/>
-          <a:p>
-            <a:pPr algn="ctr"/>
-            <a:r>
-              <a:rPr lang="en-US" b="1" dirty="0"/>
-              <a:t>Increasing data content</a:t>
-            </a:r>
-          </a:p>
-        </p:txBody>
-      </p:sp>
-      <p:pic>
-        <p:nvPicPr>
-          <p:cNvPr id="30" name="Picture 29">
-            <a:extLst>
-              <a:ext uri="{FF2B5EF4-FFF2-40B4-BE49-F238E27FC236}">
-                <a16:creationId xmlns:a16="http://schemas.microsoft.com/office/drawing/2014/main" id="{A6554A58-49B0-47AC-81B4-7F5593A6DB48}"/>
-              </a:ext>
-            </a:extLst>
-          </p:cNvPr>
-          <p:cNvPicPr>
-            <a:picLocks noChangeAspect="1"/>
-          </p:cNvPicPr>
-          <p:nvPr/>
-        </p:nvPicPr>
-        <p:blipFill>
-          <a:blip r:embed="rId5"/>
-          <a:stretch>
-            <a:fillRect/>
-          </a:stretch>
-        </p:blipFill>
-        <p:spPr>
-          <a:xfrm>
-            <a:off x="848381" y="4183367"/>
-            <a:ext cx="2542433" cy="1904143"/>
-          </a:xfrm>
-          <a:prstGeom prst="rect">
-            <a:avLst/>
-          </a:prstGeom>
-        </p:spPr>
-      </p:pic>
-      <p:sp>
-        <p:nvSpPr>
-          <p:cNvPr id="32" name="Rectangle 31">
-            <a:extLst>
-              <a:ext uri="{FF2B5EF4-FFF2-40B4-BE49-F238E27FC236}">
-                <a16:creationId xmlns:a16="http://schemas.microsoft.com/office/drawing/2014/main" id="{6241314C-BDF7-4C61-8946-4EA8552A41B4}"/>
-              </a:ext>
-            </a:extLst>
-          </p:cNvPr>
-          <p:cNvSpPr/>
-          <p:nvPr/>
-        </p:nvSpPr>
-        <p:spPr>
-          <a:xfrm>
-            <a:off x="848381" y="3749735"/>
-            <a:ext cx="2542433" cy="405353"/>
-          </a:xfrm>
-          <a:prstGeom prst="rect">
-            <a:avLst/>
-          </a:prstGeom>
-          <a:solidFill>
-            <a:schemeClr val="bg2">
-              <a:lumMod val="25000"/>
-            </a:schemeClr>
-          </a:solidFill>
-          <a:ln>
-            <a:noFill/>
-          </a:ln>
-        </p:spPr>
-        <p:style>
-          <a:lnRef idx="2">
-            <a:schemeClr val="accent1">
-              <a:shade val="50000"/>
-            </a:schemeClr>
-          </a:lnRef>
-          <a:fillRef idx="1">
-            <a:schemeClr val="accent1"/>
-          </a:fillRef>
-          <a:effectRef idx="0">
-            <a:schemeClr val="accent1"/>
-          </a:effectRef>
-          <a:fontRef idx="minor">
-            <a:schemeClr val="lt1"/>
-          </a:fontRef>
-        </p:style>
-        <p:txBody>
-          <a:bodyPr rtlCol="0" anchor="ctr"/>
-          <a:lstStyle/>
-          <a:p>
-            <a:pPr algn="ctr"/>
-            <a:r>
-              <a:rPr lang="en-US" dirty="0"/>
-              <a:t>Too much data!</a:t>
-            </a:r>
-          </a:p>
-        </p:txBody>
-      </p:sp>
-      <p:sp>
-        <p:nvSpPr>
-          <p:cNvPr id="36" name="Rectangle 35">
-            <a:extLst>
-              <a:ext uri="{FF2B5EF4-FFF2-40B4-BE49-F238E27FC236}">
-                <a16:creationId xmlns:a16="http://schemas.microsoft.com/office/drawing/2014/main" id="{4893D84F-EF7D-4BB1-A5DD-5391276B78ED}"/>
-              </a:ext>
-            </a:extLst>
-          </p:cNvPr>
-          <p:cNvSpPr/>
-          <p:nvPr/>
-        </p:nvSpPr>
-        <p:spPr>
-          <a:xfrm>
-            <a:off x="3543486" y="3749734"/>
-            <a:ext cx="2542433" cy="2309497"/>
-          </a:xfrm>
-          <a:prstGeom prst="rect">
-            <a:avLst/>
-          </a:prstGeom>
-          <a:solidFill>
-            <a:schemeClr val="bg2">
-              <a:lumMod val="25000"/>
-            </a:schemeClr>
-          </a:solidFill>
-          <a:ln>
-            <a:noFill/>
-          </a:ln>
-        </p:spPr>
-        <p:style>
-          <a:lnRef idx="2">
-            <a:schemeClr val="accent1">
-              <a:shade val="50000"/>
-            </a:schemeClr>
-          </a:lnRef>
-          <a:fillRef idx="1">
-            <a:schemeClr val="accent1"/>
-          </a:fillRef>
-          <a:effectRef idx="0">
-            <a:schemeClr val="accent1"/>
-          </a:effectRef>
-          <a:fontRef idx="minor">
-            <a:schemeClr val="lt1"/>
-          </a:fontRef>
-        </p:style>
-        <p:txBody>
-          <a:bodyPr rtlCol="0" anchor="ctr"/>
-          <a:lstStyle/>
-          <a:p>
-            <a:pPr algn="ctr"/>
-            <a:r>
-              <a:rPr lang="en-US" dirty="0"/>
-              <a:t>Too much data!</a:t>
-            </a:r>
-          </a:p>
-        </p:txBody>
-      </p:sp>
     </p:spTree>
     <p:extLst>
       <p:ext uri="{BB962C8B-B14F-4D97-AF65-F5344CB8AC3E}">
-        <p14:creationId xmlns:p14="http://schemas.microsoft.com/office/powerpoint/2010/main" val="1735491974"/>
+        <p14:creationId xmlns:p14="http://schemas.microsoft.com/office/powerpoint/2010/main" val="1185773748"/>
       </p:ext>
     </p:extLst>
   </p:cSld>

</xml_diff>